<commit_message>
Added the README and CRC Cards for game outline
</commit_message>
<xml_diff>
--- a/docs/The Heroic V (Five).pptx
+++ b/docs/The Heroic V (Five).pptx
@@ -7,6 +7,15 @@
   <p:sldIdLst>
     <p:sldId id="256" r:id="rId2"/>
     <p:sldId id="257" r:id="rId3"/>
+    <p:sldId id="258" r:id="rId4"/>
+    <p:sldId id="262" r:id="rId5"/>
+    <p:sldId id="266" r:id="rId6"/>
+    <p:sldId id="267" r:id="rId7"/>
+    <p:sldId id="268" r:id="rId8"/>
+    <p:sldId id="269" r:id="rId9"/>
+    <p:sldId id="263" r:id="rId10"/>
+    <p:sldId id="264" r:id="rId11"/>
+    <p:sldId id="265" r:id="rId12"/>
   </p:sldIdLst>
   <p:sldSz cx="12192000" cy="6858000"/>
   <p:notesSz cx="6858000" cy="9144000"/>
@@ -139,6 +148,258 @@
       </pc:sldChg>
     </pc:docChg>
   </pc:docChgLst>
+  <pc:docChgLst>
+    <pc:chgData name="Josh Wassum" userId="fb6265fc5b84bcfc" providerId="LiveId" clId="{D1057FF6-79D2-4C5B-ADE7-009935E73ACB}"/>
+    <pc:docChg chg="custSel addSld delSld modSld">
+      <pc:chgData name="Josh Wassum" userId="fb6265fc5b84bcfc" providerId="LiveId" clId="{D1057FF6-79D2-4C5B-ADE7-009935E73ACB}" dt="2021-11-13T03:34:51.842" v="1038" actId="20577"/>
+      <pc:docMkLst>
+        <pc:docMk/>
+      </pc:docMkLst>
+      <pc:sldChg chg="new del">
+        <pc:chgData name="Josh Wassum" userId="fb6265fc5b84bcfc" providerId="LiveId" clId="{D1057FF6-79D2-4C5B-ADE7-009935E73ACB}" dt="2021-11-13T03:16:35.346" v="1" actId="47"/>
+        <pc:sldMkLst>
+          <pc:docMk/>
+          <pc:sldMk cId="2716900391" sldId="258"/>
+        </pc:sldMkLst>
+      </pc:sldChg>
+      <pc:sldChg chg="modSp new mod">
+        <pc:chgData name="Josh Wassum" userId="fb6265fc5b84bcfc" providerId="LiveId" clId="{D1057FF6-79D2-4C5B-ADE7-009935E73ACB}" dt="2021-11-13T03:25:19.584" v="288" actId="20577"/>
+        <pc:sldMkLst>
+          <pc:docMk/>
+          <pc:sldMk cId="2918679572" sldId="258"/>
+        </pc:sldMkLst>
+        <pc:spChg chg="mod">
+          <ac:chgData name="Josh Wassum" userId="fb6265fc5b84bcfc" providerId="LiveId" clId="{D1057FF6-79D2-4C5B-ADE7-009935E73ACB}" dt="2021-11-13T03:17:09.167" v="13" actId="20577"/>
+          <ac:spMkLst>
+            <pc:docMk/>
+            <pc:sldMk cId="2918679572" sldId="258"/>
+            <ac:spMk id="2" creationId="{D0CD6F19-E431-4C3E-B6A9-6CBE81FFF6DC}"/>
+          </ac:spMkLst>
+        </pc:spChg>
+        <pc:spChg chg="mod">
+          <ac:chgData name="Josh Wassum" userId="fb6265fc5b84bcfc" providerId="LiveId" clId="{D1057FF6-79D2-4C5B-ADE7-009935E73ACB}" dt="2021-11-13T03:25:19.584" v="288" actId="20577"/>
+          <ac:spMkLst>
+            <pc:docMk/>
+            <pc:sldMk cId="2918679572" sldId="258"/>
+            <ac:spMk id="3" creationId="{0CB11699-6128-4BB2-93D6-8B254326185E}"/>
+          </ac:spMkLst>
+        </pc:spChg>
+      </pc:sldChg>
+      <pc:sldChg chg="modSp new del mod">
+        <pc:chgData name="Josh Wassum" userId="fb6265fc5b84bcfc" providerId="LiveId" clId="{D1057FF6-79D2-4C5B-ADE7-009935E73ACB}" dt="2021-11-13T03:22:50.878" v="123" actId="47"/>
+        <pc:sldMkLst>
+          <pc:docMk/>
+          <pc:sldMk cId="3499867372" sldId="259"/>
+        </pc:sldMkLst>
+        <pc:spChg chg="mod">
+          <ac:chgData name="Josh Wassum" userId="fb6265fc5b84bcfc" providerId="LiveId" clId="{D1057FF6-79D2-4C5B-ADE7-009935E73ACB}" dt="2021-11-13T03:19:22.116" v="71" actId="20577"/>
+          <ac:spMkLst>
+            <pc:docMk/>
+            <pc:sldMk cId="3499867372" sldId="259"/>
+            <ac:spMk id="2" creationId="{F4DACED2-E5FE-4006-BE9D-DCCC4315C22E}"/>
+          </ac:spMkLst>
+        </pc:spChg>
+      </pc:sldChg>
+      <pc:sldChg chg="modSp new del mod">
+        <pc:chgData name="Josh Wassum" userId="fb6265fc5b84bcfc" providerId="LiveId" clId="{D1057FF6-79D2-4C5B-ADE7-009935E73ACB}" dt="2021-11-13T03:22:52" v="124" actId="47"/>
+        <pc:sldMkLst>
+          <pc:docMk/>
+          <pc:sldMk cId="2274676578" sldId="260"/>
+        </pc:sldMkLst>
+        <pc:spChg chg="mod">
+          <ac:chgData name="Josh Wassum" userId="fb6265fc5b84bcfc" providerId="LiveId" clId="{D1057FF6-79D2-4C5B-ADE7-009935E73ACB}" dt="2021-11-13T03:19:31.771" v="84" actId="20577"/>
+          <ac:spMkLst>
+            <pc:docMk/>
+            <pc:sldMk cId="2274676578" sldId="260"/>
+            <ac:spMk id="2" creationId="{F1B2607D-8CD5-4A1E-879C-C611F12FBBC8}"/>
+          </ac:spMkLst>
+        </pc:spChg>
+      </pc:sldChg>
+      <pc:sldChg chg="modSp new del mod">
+        <pc:chgData name="Josh Wassum" userId="fb6265fc5b84bcfc" providerId="LiveId" clId="{D1057FF6-79D2-4C5B-ADE7-009935E73ACB}" dt="2021-11-13T03:22:52.795" v="125" actId="47"/>
+        <pc:sldMkLst>
+          <pc:docMk/>
+          <pc:sldMk cId="3605877034" sldId="261"/>
+        </pc:sldMkLst>
+        <pc:spChg chg="mod">
+          <ac:chgData name="Josh Wassum" userId="fb6265fc5b84bcfc" providerId="LiveId" clId="{D1057FF6-79D2-4C5B-ADE7-009935E73ACB}" dt="2021-11-13T03:19:42.295" v="99" actId="20577"/>
+          <ac:spMkLst>
+            <pc:docMk/>
+            <pc:sldMk cId="3605877034" sldId="261"/>
+            <ac:spMk id="2" creationId="{825A8651-5A26-4E97-91A5-0763B2365AC6}"/>
+          </ac:spMkLst>
+        </pc:spChg>
+      </pc:sldChg>
+      <pc:sldChg chg="modSp new mod">
+        <pc:chgData name="Josh Wassum" userId="fb6265fc5b84bcfc" providerId="LiveId" clId="{D1057FF6-79D2-4C5B-ADE7-009935E73ACB}" dt="2021-11-13T03:26:59.824" v="448" actId="20577"/>
+        <pc:sldMkLst>
+          <pc:docMk/>
+          <pc:sldMk cId="4167330972" sldId="262"/>
+        </pc:sldMkLst>
+        <pc:spChg chg="mod">
+          <ac:chgData name="Josh Wassum" userId="fb6265fc5b84bcfc" providerId="LiveId" clId="{D1057FF6-79D2-4C5B-ADE7-009935E73ACB}" dt="2021-11-13T03:22:07.521" v="112" actId="20577"/>
+          <ac:spMkLst>
+            <pc:docMk/>
+            <pc:sldMk cId="4167330972" sldId="262"/>
+            <ac:spMk id="2" creationId="{8DFEFBEA-A69A-4C80-8825-185F73FA9652}"/>
+          </ac:spMkLst>
+        </pc:spChg>
+        <pc:spChg chg="mod">
+          <ac:chgData name="Josh Wassum" userId="fb6265fc5b84bcfc" providerId="LiveId" clId="{D1057FF6-79D2-4C5B-ADE7-009935E73ACB}" dt="2021-11-13T03:26:59.824" v="448" actId="20577"/>
+          <ac:spMkLst>
+            <pc:docMk/>
+            <pc:sldMk cId="4167330972" sldId="262"/>
+            <ac:spMk id="3" creationId="{4ED4F2F8-5406-44F0-9D7A-369941F8B9FC}"/>
+          </ac:spMkLst>
+        </pc:spChg>
+      </pc:sldChg>
+      <pc:sldChg chg="modSp new mod">
+        <pc:chgData name="Josh Wassum" userId="fb6265fc5b84bcfc" providerId="LiveId" clId="{D1057FF6-79D2-4C5B-ADE7-009935E73ACB}" dt="2021-11-13T03:23:45.761" v="150" actId="20577"/>
+        <pc:sldMkLst>
+          <pc:docMk/>
+          <pc:sldMk cId="3522928421" sldId="263"/>
+        </pc:sldMkLst>
+        <pc:spChg chg="mod">
+          <ac:chgData name="Josh Wassum" userId="fb6265fc5b84bcfc" providerId="LiveId" clId="{D1057FF6-79D2-4C5B-ADE7-009935E73ACB}" dt="2021-11-13T03:23:45.761" v="150" actId="20577"/>
+          <ac:spMkLst>
+            <pc:docMk/>
+            <pc:sldMk cId="3522928421" sldId="263"/>
+            <ac:spMk id="2" creationId="{C4E993F9-FF22-44FA-9189-B3C30010754B}"/>
+          </ac:spMkLst>
+        </pc:spChg>
+      </pc:sldChg>
+      <pc:sldChg chg="modSp new mod">
+        <pc:chgData name="Josh Wassum" userId="fb6265fc5b84bcfc" providerId="LiveId" clId="{D1057FF6-79D2-4C5B-ADE7-009935E73ACB}" dt="2021-11-13T03:24:04.364" v="175" actId="20577"/>
+        <pc:sldMkLst>
+          <pc:docMk/>
+          <pc:sldMk cId="3124848664" sldId="264"/>
+        </pc:sldMkLst>
+        <pc:spChg chg="mod">
+          <ac:chgData name="Josh Wassum" userId="fb6265fc5b84bcfc" providerId="LiveId" clId="{D1057FF6-79D2-4C5B-ADE7-009935E73ACB}" dt="2021-11-13T03:24:04.364" v="175" actId="20577"/>
+          <ac:spMkLst>
+            <pc:docMk/>
+            <pc:sldMk cId="3124848664" sldId="264"/>
+            <ac:spMk id="2" creationId="{955D95A7-A4BC-4F2B-9B1E-A1FCF2328B55}"/>
+          </ac:spMkLst>
+        </pc:spChg>
+      </pc:sldChg>
+      <pc:sldChg chg="modSp new mod">
+        <pc:chgData name="Josh Wassum" userId="fb6265fc5b84bcfc" providerId="LiveId" clId="{D1057FF6-79D2-4C5B-ADE7-009935E73ACB}" dt="2021-11-13T03:24:18.802" v="195" actId="20577"/>
+        <pc:sldMkLst>
+          <pc:docMk/>
+          <pc:sldMk cId="84111507" sldId="265"/>
+        </pc:sldMkLst>
+        <pc:spChg chg="mod">
+          <ac:chgData name="Josh Wassum" userId="fb6265fc5b84bcfc" providerId="LiveId" clId="{D1057FF6-79D2-4C5B-ADE7-009935E73ACB}" dt="2021-11-13T03:24:18.802" v="195" actId="20577"/>
+          <ac:spMkLst>
+            <pc:docMk/>
+            <pc:sldMk cId="84111507" sldId="265"/>
+            <ac:spMk id="2" creationId="{49969EEC-BF6D-4C0B-8635-F8830E5305ED}"/>
+          </ac:spMkLst>
+        </pc:spChg>
+      </pc:sldChg>
+      <pc:sldChg chg="modSp new mod">
+        <pc:chgData name="Josh Wassum" userId="fb6265fc5b84bcfc" providerId="LiveId" clId="{D1057FF6-79D2-4C5B-ADE7-009935E73ACB}" dt="2021-11-13T03:30:26.023" v="693" actId="20577"/>
+        <pc:sldMkLst>
+          <pc:docMk/>
+          <pc:sldMk cId="4265210884" sldId="266"/>
+        </pc:sldMkLst>
+        <pc:spChg chg="mod">
+          <ac:chgData name="Josh Wassum" userId="fb6265fc5b84bcfc" providerId="LiveId" clId="{D1057FF6-79D2-4C5B-ADE7-009935E73ACB}" dt="2021-11-13T03:30:26.023" v="693" actId="20577"/>
+          <ac:spMkLst>
+            <pc:docMk/>
+            <pc:sldMk cId="4265210884" sldId="266"/>
+            <ac:spMk id="2" creationId="{AB5388C1-5AE0-4716-AFB4-66240983AEC1}"/>
+          </ac:spMkLst>
+        </pc:spChg>
+        <pc:spChg chg="mod">
+          <ac:chgData name="Josh Wassum" userId="fb6265fc5b84bcfc" providerId="LiveId" clId="{D1057FF6-79D2-4C5B-ADE7-009935E73ACB}" dt="2021-11-13T03:28:36.932" v="526" actId="20577"/>
+          <ac:spMkLst>
+            <pc:docMk/>
+            <pc:sldMk cId="4265210884" sldId="266"/>
+            <ac:spMk id="3" creationId="{95EE0EA3-6DE0-4F08-97C8-6615FB14E6EA}"/>
+          </ac:spMkLst>
+        </pc:spChg>
+      </pc:sldChg>
+      <pc:sldChg chg="modSp new mod">
+        <pc:chgData name="Josh Wassum" userId="fb6265fc5b84bcfc" providerId="LiveId" clId="{D1057FF6-79D2-4C5B-ADE7-009935E73ACB}" dt="2021-11-13T03:30:23.991" v="692" actId="20577"/>
+        <pc:sldMkLst>
+          <pc:docMk/>
+          <pc:sldMk cId="3966481404" sldId="267"/>
+        </pc:sldMkLst>
+        <pc:spChg chg="mod">
+          <ac:chgData name="Josh Wassum" userId="fb6265fc5b84bcfc" providerId="LiveId" clId="{D1057FF6-79D2-4C5B-ADE7-009935E73ACB}" dt="2021-11-13T03:30:23.991" v="692" actId="20577"/>
+          <ac:spMkLst>
+            <pc:docMk/>
+            <pc:sldMk cId="3966481404" sldId="267"/>
+            <ac:spMk id="2" creationId="{E7006F5A-D609-41F0-A288-8EB32F171576}"/>
+          </ac:spMkLst>
+        </pc:spChg>
+        <pc:spChg chg="mod">
+          <ac:chgData name="Josh Wassum" userId="fb6265fc5b84bcfc" providerId="LiveId" clId="{D1057FF6-79D2-4C5B-ADE7-009935E73ACB}" dt="2021-11-13T03:29:47.391" v="691" actId="20577"/>
+          <ac:spMkLst>
+            <pc:docMk/>
+            <pc:sldMk cId="3966481404" sldId="267"/>
+            <ac:spMk id="3" creationId="{45788C37-68FE-4782-B20C-1F0BA58AD48F}"/>
+          </ac:spMkLst>
+        </pc:spChg>
+      </pc:sldChg>
+      <pc:sldChg chg="modSp new mod">
+        <pc:chgData name="Josh Wassum" userId="fb6265fc5b84bcfc" providerId="LiveId" clId="{D1057FF6-79D2-4C5B-ADE7-009935E73ACB}" dt="2021-11-13T03:31:17.530" v="790" actId="20577"/>
+        <pc:sldMkLst>
+          <pc:docMk/>
+          <pc:sldMk cId="321454203" sldId="268"/>
+        </pc:sldMkLst>
+        <pc:spChg chg="mod">
+          <ac:chgData name="Josh Wassum" userId="fb6265fc5b84bcfc" providerId="LiveId" clId="{D1057FF6-79D2-4C5B-ADE7-009935E73ACB}" dt="2021-11-13T03:30:42.412" v="708" actId="20577"/>
+          <ac:spMkLst>
+            <pc:docMk/>
+            <pc:sldMk cId="321454203" sldId="268"/>
+            <ac:spMk id="2" creationId="{3EDBA5B3-1911-4268-A262-AD93A4E43626}"/>
+          </ac:spMkLst>
+        </pc:spChg>
+        <pc:spChg chg="mod">
+          <ac:chgData name="Josh Wassum" userId="fb6265fc5b84bcfc" providerId="LiveId" clId="{D1057FF6-79D2-4C5B-ADE7-009935E73ACB}" dt="2021-11-13T03:31:17.530" v="790" actId="20577"/>
+          <ac:spMkLst>
+            <pc:docMk/>
+            <pc:sldMk cId="321454203" sldId="268"/>
+            <ac:spMk id="3" creationId="{D6E67422-5A05-4F27-B3F8-F6157B1C9FD6}"/>
+          </ac:spMkLst>
+        </pc:spChg>
+      </pc:sldChg>
+      <pc:sldChg chg="modSp new mod">
+        <pc:chgData name="Josh Wassum" userId="fb6265fc5b84bcfc" providerId="LiveId" clId="{D1057FF6-79D2-4C5B-ADE7-009935E73ACB}" dt="2021-11-13T03:34:51.842" v="1038" actId="20577"/>
+        <pc:sldMkLst>
+          <pc:docMk/>
+          <pc:sldMk cId="932568532" sldId="269"/>
+        </pc:sldMkLst>
+        <pc:spChg chg="mod">
+          <ac:chgData name="Josh Wassum" userId="fb6265fc5b84bcfc" providerId="LiveId" clId="{D1057FF6-79D2-4C5B-ADE7-009935E73ACB}" dt="2021-11-13T03:32:55.675" v="806" actId="20577"/>
+          <ac:spMkLst>
+            <pc:docMk/>
+            <pc:sldMk cId="932568532" sldId="269"/>
+            <ac:spMk id="2" creationId="{60F5CA51-61B6-424A-BB01-6D439D4F93C5}"/>
+          </ac:spMkLst>
+        </pc:spChg>
+        <pc:spChg chg="mod">
+          <ac:chgData name="Josh Wassum" userId="fb6265fc5b84bcfc" providerId="LiveId" clId="{D1057FF6-79D2-4C5B-ADE7-009935E73ACB}" dt="2021-11-13T03:34:51.842" v="1038" actId="20577"/>
+          <ac:spMkLst>
+            <pc:docMk/>
+            <pc:sldMk cId="932568532" sldId="269"/>
+            <ac:spMk id="3" creationId="{9F39D27B-5BB0-425C-A2EF-022F7CF29A23}"/>
+          </ac:spMkLst>
+        </pc:spChg>
+        <pc:spChg chg="mod">
+          <ac:chgData name="Josh Wassum" userId="fb6265fc5b84bcfc" providerId="LiveId" clId="{D1057FF6-79D2-4C5B-ADE7-009935E73ACB}" dt="2021-11-13T03:34:46.290" v="1020" actId="27636"/>
+          <ac:spMkLst>
+            <pc:docMk/>
+            <pc:sldMk cId="932568532" sldId="269"/>
+            <ac:spMk id="4" creationId="{C512575D-0C42-46DF-B595-FF44E303F521}"/>
+          </ac:spMkLst>
+        </pc:spChg>
+      </pc:sldChg>
+    </pc:docChg>
+  </pc:docChgLst>
 </pc:chgInfo>
 </file>
 
@@ -289,7 +550,7 @@
           <a:p>
             <a:fld id="{5E070E7C-C41D-4186-9D77-646936151585}" type="datetimeFigureOut">
               <a:rPr lang="en-US" smtClean="0"/>
-              <a:t>11/11/2021</a:t>
+              <a:t>11/12/2021</a:t>
             </a:fld>
             <a:endParaRPr lang="en-US"/>
           </a:p>
@@ -487,7 +748,7 @@
           <a:p>
             <a:fld id="{5E070E7C-C41D-4186-9D77-646936151585}" type="datetimeFigureOut">
               <a:rPr lang="en-US" smtClean="0"/>
-              <a:t>11/11/2021</a:t>
+              <a:t>11/12/2021</a:t>
             </a:fld>
             <a:endParaRPr lang="en-US"/>
           </a:p>
@@ -695,7 +956,7 @@
           <a:p>
             <a:fld id="{5E070E7C-C41D-4186-9D77-646936151585}" type="datetimeFigureOut">
               <a:rPr lang="en-US" smtClean="0"/>
-              <a:t>11/11/2021</a:t>
+              <a:t>11/12/2021</a:t>
             </a:fld>
             <a:endParaRPr lang="en-US"/>
           </a:p>
@@ -893,7 +1154,7 @@
           <a:p>
             <a:fld id="{5E070E7C-C41D-4186-9D77-646936151585}" type="datetimeFigureOut">
               <a:rPr lang="en-US" smtClean="0"/>
-              <a:t>11/11/2021</a:t>
+              <a:t>11/12/2021</a:t>
             </a:fld>
             <a:endParaRPr lang="en-US"/>
           </a:p>
@@ -1168,7 +1429,7 @@
           <a:p>
             <a:fld id="{5E070E7C-C41D-4186-9D77-646936151585}" type="datetimeFigureOut">
               <a:rPr lang="en-US" smtClean="0"/>
-              <a:t>11/11/2021</a:t>
+              <a:t>11/12/2021</a:t>
             </a:fld>
             <a:endParaRPr lang="en-US"/>
           </a:p>
@@ -1433,7 +1694,7 @@
           <a:p>
             <a:fld id="{5E070E7C-C41D-4186-9D77-646936151585}" type="datetimeFigureOut">
               <a:rPr lang="en-US" smtClean="0"/>
-              <a:t>11/11/2021</a:t>
+              <a:t>11/12/2021</a:t>
             </a:fld>
             <a:endParaRPr lang="en-US"/>
           </a:p>
@@ -1845,7 +2106,7 @@
           <a:p>
             <a:fld id="{5E070E7C-C41D-4186-9D77-646936151585}" type="datetimeFigureOut">
               <a:rPr lang="en-US" smtClean="0"/>
-              <a:t>11/11/2021</a:t>
+              <a:t>11/12/2021</a:t>
             </a:fld>
             <a:endParaRPr lang="en-US"/>
           </a:p>
@@ -1986,7 +2247,7 @@
           <a:p>
             <a:fld id="{5E070E7C-C41D-4186-9D77-646936151585}" type="datetimeFigureOut">
               <a:rPr lang="en-US" smtClean="0"/>
-              <a:t>11/11/2021</a:t>
+              <a:t>11/12/2021</a:t>
             </a:fld>
             <a:endParaRPr lang="en-US"/>
           </a:p>
@@ -2099,7 +2360,7 @@
           <a:p>
             <a:fld id="{5E070E7C-C41D-4186-9D77-646936151585}" type="datetimeFigureOut">
               <a:rPr lang="en-US" smtClean="0"/>
-              <a:t>11/11/2021</a:t>
+              <a:t>11/12/2021</a:t>
             </a:fld>
             <a:endParaRPr lang="en-US"/>
           </a:p>
@@ -2410,7 +2671,7 @@
           <a:p>
             <a:fld id="{5E070E7C-C41D-4186-9D77-646936151585}" type="datetimeFigureOut">
               <a:rPr lang="en-US" smtClean="0"/>
-              <a:t>11/11/2021</a:t>
+              <a:t>11/12/2021</a:t>
             </a:fld>
             <a:endParaRPr lang="en-US"/>
           </a:p>
@@ -2698,7 +2959,7 @@
           <a:p>
             <a:fld id="{5E070E7C-C41D-4186-9D77-646936151585}" type="datetimeFigureOut">
               <a:rPr lang="en-US" smtClean="0"/>
-              <a:t>11/11/2021</a:t>
+              <a:t>11/12/2021</a:t>
             </a:fld>
             <a:endParaRPr lang="en-US"/>
           </a:p>
@@ -2939,7 +3200,7 @@
           <a:p>
             <a:fld id="{5E070E7C-C41D-4186-9D77-646936151585}" type="datetimeFigureOut">
               <a:rPr lang="en-US" smtClean="0"/>
-              <a:t>11/11/2021</a:t>
+              <a:t>11/12/2021</a:t>
             </a:fld>
             <a:endParaRPr lang="en-US"/>
           </a:p>
@@ -3425,6 +3686,227 @@
 </p:sld>
 </file>
 
+<file path=ppt/slides/slide10.xml><?xml version="1.0" encoding="utf-8"?>
+<p:sld xmlns:a="http://schemas.openxmlformats.org/drawingml/2006/main" xmlns:r="http://schemas.openxmlformats.org/officeDocument/2006/relationships" xmlns:p="http://schemas.openxmlformats.org/presentationml/2006/main">
+  <p:cSld>
+    <p:spTree>
+      <p:nvGrpSpPr>
+        <p:cNvPr id="1" name=""/>
+        <p:cNvGrpSpPr/>
+        <p:nvPr/>
+      </p:nvGrpSpPr>
+      <p:grpSpPr>
+        <a:xfrm>
+          <a:off x="0" y="0"/>
+          <a:ext cx="0" cy="0"/>
+          <a:chOff x="0" y="0"/>
+          <a:chExt cx="0" cy="0"/>
+        </a:xfrm>
+      </p:grpSpPr>
+      <p:sp>
+        <p:nvSpPr>
+          <p:cNvPr id="2" name="Title 1">
+            <a:extLst>
+              <a:ext uri="{FF2B5EF4-FFF2-40B4-BE49-F238E27FC236}">
+                <a16:creationId xmlns:a16="http://schemas.microsoft.com/office/drawing/2014/main" id="{955D95A7-A4BC-4F2B-9B1E-A1FCF2328B55}"/>
+              </a:ext>
+            </a:extLst>
+          </p:cNvPr>
+          <p:cNvSpPr>
+            <a:spLocks noGrp="1"/>
+          </p:cNvSpPr>
+          <p:nvPr>
+            <p:ph type="title"/>
+          </p:nvPr>
+        </p:nvSpPr>
+        <p:spPr/>
+        <p:txBody>
+          <a:bodyPr/>
+          <a:lstStyle/>
+          <a:p>
+            <a:r>
+              <a:rPr lang="en-US" dirty="0" err="1"/>
+              <a:t>Output_service</a:t>
+            </a:r>
+            <a:r>
+              <a:rPr lang="en-US" dirty="0"/>
+              <a:t> class</a:t>
+            </a:r>
+          </a:p>
+        </p:txBody>
+      </p:sp>
+      <p:sp>
+        <p:nvSpPr>
+          <p:cNvPr id="3" name="Content Placeholder 2">
+            <a:extLst>
+              <a:ext uri="{FF2B5EF4-FFF2-40B4-BE49-F238E27FC236}">
+                <a16:creationId xmlns:a16="http://schemas.microsoft.com/office/drawing/2014/main" id="{427B8A62-2755-4F99-BBCB-682B05BA0DA4}"/>
+              </a:ext>
+            </a:extLst>
+          </p:cNvPr>
+          <p:cNvSpPr>
+            <a:spLocks noGrp="1"/>
+          </p:cNvSpPr>
+          <p:nvPr>
+            <p:ph sz="half" idx="1"/>
+          </p:nvPr>
+        </p:nvSpPr>
+        <p:spPr/>
+        <p:txBody>
+          <a:bodyPr/>
+          <a:lstStyle/>
+          <a:p>
+            <a:endParaRPr lang="en-US"/>
+          </a:p>
+        </p:txBody>
+      </p:sp>
+      <p:sp>
+        <p:nvSpPr>
+          <p:cNvPr id="4" name="Content Placeholder 3">
+            <a:extLst>
+              <a:ext uri="{FF2B5EF4-FFF2-40B4-BE49-F238E27FC236}">
+                <a16:creationId xmlns:a16="http://schemas.microsoft.com/office/drawing/2014/main" id="{92929F69-43B3-42F0-9B04-1B8DEB741345}"/>
+              </a:ext>
+            </a:extLst>
+          </p:cNvPr>
+          <p:cNvSpPr>
+            <a:spLocks noGrp="1"/>
+          </p:cNvSpPr>
+          <p:nvPr>
+            <p:ph sz="half" idx="2"/>
+          </p:nvPr>
+        </p:nvSpPr>
+        <p:spPr/>
+        <p:txBody>
+          <a:bodyPr/>
+          <a:lstStyle/>
+          <a:p>
+            <a:endParaRPr lang="en-US"/>
+          </a:p>
+        </p:txBody>
+      </p:sp>
+    </p:spTree>
+    <p:extLst>
+      <p:ext uri="{BB962C8B-B14F-4D97-AF65-F5344CB8AC3E}">
+        <p14:creationId xmlns:p14="http://schemas.microsoft.com/office/powerpoint/2010/main" val="3124848664"/>
+      </p:ext>
+    </p:extLst>
+  </p:cSld>
+  <p:clrMapOvr>
+    <a:masterClrMapping/>
+  </p:clrMapOvr>
+</p:sld>
+</file>
+
+<file path=ppt/slides/slide11.xml><?xml version="1.0" encoding="utf-8"?>
+<p:sld xmlns:a="http://schemas.openxmlformats.org/drawingml/2006/main" xmlns:r="http://schemas.openxmlformats.org/officeDocument/2006/relationships" xmlns:p="http://schemas.openxmlformats.org/presentationml/2006/main">
+  <p:cSld>
+    <p:spTree>
+      <p:nvGrpSpPr>
+        <p:cNvPr id="1" name=""/>
+        <p:cNvGrpSpPr/>
+        <p:nvPr/>
+      </p:nvGrpSpPr>
+      <p:grpSpPr>
+        <a:xfrm>
+          <a:off x="0" y="0"/>
+          <a:ext cx="0" cy="0"/>
+          <a:chOff x="0" y="0"/>
+          <a:chExt cx="0" cy="0"/>
+        </a:xfrm>
+      </p:grpSpPr>
+      <p:sp>
+        <p:nvSpPr>
+          <p:cNvPr id="2" name="Title 1">
+            <a:extLst>
+              <a:ext uri="{FF2B5EF4-FFF2-40B4-BE49-F238E27FC236}">
+                <a16:creationId xmlns:a16="http://schemas.microsoft.com/office/drawing/2014/main" id="{49969EEC-BF6D-4C0B-8635-F8830E5305ED}"/>
+              </a:ext>
+            </a:extLst>
+          </p:cNvPr>
+          <p:cNvSpPr>
+            <a:spLocks noGrp="1"/>
+          </p:cNvSpPr>
+          <p:nvPr>
+            <p:ph type="title"/>
+          </p:nvPr>
+        </p:nvSpPr>
+        <p:spPr/>
+        <p:txBody>
+          <a:bodyPr/>
+          <a:lstStyle/>
+          <a:p>
+            <a:r>
+              <a:rPr lang="en-US" dirty="0" err="1"/>
+              <a:t>Handle_collisions</a:t>
+            </a:r>
+            <a:endParaRPr lang="en-US" dirty="0"/>
+          </a:p>
+        </p:txBody>
+      </p:sp>
+      <p:sp>
+        <p:nvSpPr>
+          <p:cNvPr id="3" name="Content Placeholder 2">
+            <a:extLst>
+              <a:ext uri="{FF2B5EF4-FFF2-40B4-BE49-F238E27FC236}">
+                <a16:creationId xmlns:a16="http://schemas.microsoft.com/office/drawing/2014/main" id="{81C3CDBC-290D-404C-A203-F75431B87BDA}"/>
+              </a:ext>
+            </a:extLst>
+          </p:cNvPr>
+          <p:cNvSpPr>
+            <a:spLocks noGrp="1"/>
+          </p:cNvSpPr>
+          <p:nvPr>
+            <p:ph sz="half" idx="1"/>
+          </p:nvPr>
+        </p:nvSpPr>
+        <p:spPr/>
+        <p:txBody>
+          <a:bodyPr/>
+          <a:lstStyle/>
+          <a:p>
+            <a:endParaRPr lang="en-US" dirty="0"/>
+          </a:p>
+        </p:txBody>
+      </p:sp>
+      <p:sp>
+        <p:nvSpPr>
+          <p:cNvPr id="4" name="Content Placeholder 3">
+            <a:extLst>
+              <a:ext uri="{FF2B5EF4-FFF2-40B4-BE49-F238E27FC236}">
+                <a16:creationId xmlns:a16="http://schemas.microsoft.com/office/drawing/2014/main" id="{A92C28FB-B2FC-4C04-864E-4D85BE3781D5}"/>
+              </a:ext>
+            </a:extLst>
+          </p:cNvPr>
+          <p:cNvSpPr>
+            <a:spLocks noGrp="1"/>
+          </p:cNvSpPr>
+          <p:nvPr>
+            <p:ph sz="half" idx="2"/>
+          </p:nvPr>
+        </p:nvSpPr>
+        <p:spPr/>
+        <p:txBody>
+          <a:bodyPr/>
+          <a:lstStyle/>
+          <a:p>
+            <a:endParaRPr lang="en-US"/>
+          </a:p>
+        </p:txBody>
+      </p:sp>
+    </p:spTree>
+    <p:extLst>
+      <p:ext uri="{BB962C8B-B14F-4D97-AF65-F5344CB8AC3E}">
+        <p14:creationId xmlns:p14="http://schemas.microsoft.com/office/powerpoint/2010/main" val="84111507"/>
+      </p:ext>
+    </p:extLst>
+  </p:cSld>
+  <p:clrMapOvr>
+    <a:masterClrMapping/>
+  </p:clrMapOvr>
+</p:sld>
+</file>
+
 <file path=ppt/slides/slide2.xml><?xml version="1.0" encoding="utf-8"?>
 <p:sld xmlns:a="http://schemas.openxmlformats.org/drawingml/2006/main" xmlns:r="http://schemas.openxmlformats.org/officeDocument/2006/relationships" xmlns:p="http://schemas.openxmlformats.org/presentationml/2006/main">
   <p:cSld>
@@ -3799,6 +4281,967 @@
     <p:extLst>
       <p:ext uri="{BB962C8B-B14F-4D97-AF65-F5344CB8AC3E}">
         <p14:creationId xmlns:p14="http://schemas.microsoft.com/office/powerpoint/2010/main" val="2308831214"/>
+      </p:ext>
+    </p:extLst>
+  </p:cSld>
+  <p:clrMapOvr>
+    <a:masterClrMapping/>
+  </p:clrMapOvr>
+</p:sld>
+</file>
+
+<file path=ppt/slides/slide3.xml><?xml version="1.0" encoding="utf-8"?>
+<p:sld xmlns:a="http://schemas.openxmlformats.org/drawingml/2006/main" xmlns:r="http://schemas.openxmlformats.org/officeDocument/2006/relationships" xmlns:p="http://schemas.openxmlformats.org/presentationml/2006/main">
+  <p:cSld>
+    <p:spTree>
+      <p:nvGrpSpPr>
+        <p:cNvPr id="1" name=""/>
+        <p:cNvGrpSpPr/>
+        <p:nvPr/>
+      </p:nvGrpSpPr>
+      <p:grpSpPr>
+        <a:xfrm>
+          <a:off x="0" y="0"/>
+          <a:ext cx="0" cy="0"/>
+          <a:chOff x="0" y="0"/>
+          <a:chExt cx="0" cy="0"/>
+        </a:xfrm>
+      </p:grpSpPr>
+      <p:sp>
+        <p:nvSpPr>
+          <p:cNvPr id="2" name="Title 1">
+            <a:extLst>
+              <a:ext uri="{FF2B5EF4-FFF2-40B4-BE49-F238E27FC236}">
+                <a16:creationId xmlns:a16="http://schemas.microsoft.com/office/drawing/2014/main" id="{D0CD6F19-E431-4C3E-B6A9-6CBE81FFF6DC}"/>
+              </a:ext>
+            </a:extLst>
+          </p:cNvPr>
+          <p:cNvSpPr>
+            <a:spLocks noGrp="1"/>
+          </p:cNvSpPr>
+          <p:nvPr>
+            <p:ph type="title"/>
+          </p:nvPr>
+        </p:nvSpPr>
+        <p:spPr/>
+        <p:txBody>
+          <a:bodyPr/>
+          <a:lstStyle/>
+          <a:p>
+            <a:r>
+              <a:rPr lang="en-US" dirty="0"/>
+              <a:t>Actor Class</a:t>
+            </a:r>
+          </a:p>
+        </p:txBody>
+      </p:sp>
+      <p:sp>
+        <p:nvSpPr>
+          <p:cNvPr id="3" name="Content Placeholder 2">
+            <a:extLst>
+              <a:ext uri="{FF2B5EF4-FFF2-40B4-BE49-F238E27FC236}">
+                <a16:creationId xmlns:a16="http://schemas.microsoft.com/office/drawing/2014/main" id="{0CB11699-6128-4BB2-93D6-8B254326185E}"/>
+              </a:ext>
+            </a:extLst>
+          </p:cNvPr>
+          <p:cNvSpPr>
+            <a:spLocks noGrp="1"/>
+          </p:cNvSpPr>
+          <p:nvPr>
+            <p:ph sz="half" idx="1"/>
+          </p:nvPr>
+        </p:nvSpPr>
+        <p:spPr/>
+        <p:txBody>
+          <a:bodyPr/>
+          <a:lstStyle/>
+          <a:p>
+            <a:r>
+              <a:rPr lang="en-US" dirty="0"/>
+              <a:t>Houses the basic functions for our in-game objects.</a:t>
+            </a:r>
+          </a:p>
+          <a:p>
+            <a:pPr lvl="1"/>
+            <a:r>
+              <a:rPr lang="en-US" dirty="0"/>
+              <a:t>Player</a:t>
+            </a:r>
+          </a:p>
+          <a:p>
+            <a:pPr lvl="1"/>
+            <a:r>
+              <a:rPr lang="en-US" dirty="0"/>
+              <a:t>Coins</a:t>
+            </a:r>
+          </a:p>
+          <a:p>
+            <a:pPr lvl="1"/>
+            <a:r>
+              <a:rPr lang="en-US" dirty="0"/>
+              <a:t>Platform</a:t>
+            </a:r>
+          </a:p>
+          <a:p>
+            <a:pPr lvl="1"/>
+            <a:r>
+              <a:rPr lang="en-US" dirty="0" err="1"/>
+              <a:t>Riddlemaster</a:t>
+            </a:r>
+            <a:endParaRPr lang="en-US" dirty="0"/>
+          </a:p>
+          <a:p>
+            <a:endParaRPr lang="en-US" dirty="0"/>
+          </a:p>
+        </p:txBody>
+      </p:sp>
+      <p:sp>
+        <p:nvSpPr>
+          <p:cNvPr id="4" name="Content Placeholder 3">
+            <a:extLst>
+              <a:ext uri="{FF2B5EF4-FFF2-40B4-BE49-F238E27FC236}">
+                <a16:creationId xmlns:a16="http://schemas.microsoft.com/office/drawing/2014/main" id="{68D0340F-C841-4A7D-A192-BE0B8A147F8A}"/>
+              </a:ext>
+            </a:extLst>
+          </p:cNvPr>
+          <p:cNvSpPr>
+            <a:spLocks noGrp="1"/>
+          </p:cNvSpPr>
+          <p:nvPr>
+            <p:ph sz="half" idx="2"/>
+          </p:nvPr>
+        </p:nvSpPr>
+        <p:spPr/>
+        <p:txBody>
+          <a:bodyPr/>
+          <a:lstStyle/>
+          <a:p>
+            <a:endParaRPr lang="en-US"/>
+          </a:p>
+        </p:txBody>
+      </p:sp>
+    </p:spTree>
+    <p:extLst>
+      <p:ext uri="{BB962C8B-B14F-4D97-AF65-F5344CB8AC3E}">
+        <p14:creationId xmlns:p14="http://schemas.microsoft.com/office/powerpoint/2010/main" val="2918679572"/>
+      </p:ext>
+    </p:extLst>
+  </p:cSld>
+  <p:clrMapOvr>
+    <a:masterClrMapping/>
+  </p:clrMapOvr>
+</p:sld>
+</file>
+
+<file path=ppt/slides/slide4.xml><?xml version="1.0" encoding="utf-8"?>
+<p:sld xmlns:a="http://schemas.openxmlformats.org/drawingml/2006/main" xmlns:r="http://schemas.openxmlformats.org/officeDocument/2006/relationships" xmlns:p="http://schemas.openxmlformats.org/presentationml/2006/main">
+  <p:cSld>
+    <p:spTree>
+      <p:nvGrpSpPr>
+        <p:cNvPr id="1" name=""/>
+        <p:cNvGrpSpPr/>
+        <p:nvPr/>
+      </p:nvGrpSpPr>
+      <p:grpSpPr>
+        <a:xfrm>
+          <a:off x="0" y="0"/>
+          <a:ext cx="0" cy="0"/>
+          <a:chOff x="0" y="0"/>
+          <a:chExt cx="0" cy="0"/>
+        </a:xfrm>
+      </p:grpSpPr>
+      <p:sp>
+        <p:nvSpPr>
+          <p:cNvPr id="2" name="Title 1">
+            <a:extLst>
+              <a:ext uri="{FF2B5EF4-FFF2-40B4-BE49-F238E27FC236}">
+                <a16:creationId xmlns:a16="http://schemas.microsoft.com/office/drawing/2014/main" id="{8DFEFBEA-A69A-4C80-8825-185F73FA9652}"/>
+              </a:ext>
+            </a:extLst>
+          </p:cNvPr>
+          <p:cNvSpPr>
+            <a:spLocks noGrp="1"/>
+          </p:cNvSpPr>
+          <p:nvPr>
+            <p:ph type="title"/>
+          </p:nvPr>
+        </p:nvSpPr>
+        <p:spPr/>
+        <p:txBody>
+          <a:bodyPr/>
+          <a:lstStyle/>
+          <a:p>
+            <a:r>
+              <a:rPr lang="en-US" dirty="0"/>
+              <a:t>Action class</a:t>
+            </a:r>
+          </a:p>
+        </p:txBody>
+      </p:sp>
+      <p:sp>
+        <p:nvSpPr>
+          <p:cNvPr id="3" name="Content Placeholder 2">
+            <a:extLst>
+              <a:ext uri="{FF2B5EF4-FFF2-40B4-BE49-F238E27FC236}">
+                <a16:creationId xmlns:a16="http://schemas.microsoft.com/office/drawing/2014/main" id="{4ED4F2F8-5406-44F0-9D7A-369941F8B9FC}"/>
+              </a:ext>
+            </a:extLst>
+          </p:cNvPr>
+          <p:cNvSpPr>
+            <a:spLocks noGrp="1"/>
+          </p:cNvSpPr>
+          <p:nvPr>
+            <p:ph sz="half" idx="1"/>
+          </p:nvPr>
+        </p:nvSpPr>
+        <p:spPr/>
+        <p:txBody>
+          <a:bodyPr/>
+          <a:lstStyle/>
+          <a:p>
+            <a:r>
+              <a:rPr lang="en-US" dirty="0"/>
+              <a:t>Handle in game actions that the user or in game objects might take.</a:t>
+            </a:r>
+          </a:p>
+          <a:p>
+            <a:pPr lvl="1"/>
+            <a:r>
+              <a:rPr lang="en-US" dirty="0"/>
+              <a:t>Handle Collisions</a:t>
+            </a:r>
+          </a:p>
+          <a:p>
+            <a:pPr lvl="1"/>
+            <a:r>
+              <a:rPr lang="en-US" dirty="0"/>
+              <a:t>Draw actors action</a:t>
+            </a:r>
+          </a:p>
+          <a:p>
+            <a:pPr lvl="1"/>
+            <a:r>
+              <a:rPr lang="en-US" dirty="0"/>
+              <a:t>Control actors action</a:t>
+            </a:r>
+          </a:p>
+        </p:txBody>
+      </p:sp>
+      <p:sp>
+        <p:nvSpPr>
+          <p:cNvPr id="4" name="Content Placeholder 3">
+            <a:extLst>
+              <a:ext uri="{FF2B5EF4-FFF2-40B4-BE49-F238E27FC236}">
+                <a16:creationId xmlns:a16="http://schemas.microsoft.com/office/drawing/2014/main" id="{6EEF2990-019F-43B1-AA82-E449F7BA2D4C}"/>
+              </a:ext>
+            </a:extLst>
+          </p:cNvPr>
+          <p:cNvSpPr>
+            <a:spLocks noGrp="1"/>
+          </p:cNvSpPr>
+          <p:nvPr>
+            <p:ph sz="half" idx="2"/>
+          </p:nvPr>
+        </p:nvSpPr>
+        <p:spPr/>
+        <p:txBody>
+          <a:bodyPr/>
+          <a:lstStyle/>
+          <a:p>
+            <a:endParaRPr lang="en-US"/>
+          </a:p>
+        </p:txBody>
+      </p:sp>
+    </p:spTree>
+    <p:extLst>
+      <p:ext uri="{BB962C8B-B14F-4D97-AF65-F5344CB8AC3E}">
+        <p14:creationId xmlns:p14="http://schemas.microsoft.com/office/powerpoint/2010/main" val="4167330972"/>
+      </p:ext>
+    </p:extLst>
+  </p:cSld>
+  <p:clrMapOvr>
+    <a:masterClrMapping/>
+  </p:clrMapOvr>
+</p:sld>
+</file>
+
+<file path=ppt/slides/slide5.xml><?xml version="1.0" encoding="utf-8"?>
+<p:sld xmlns:a="http://schemas.openxmlformats.org/drawingml/2006/main" xmlns:r="http://schemas.openxmlformats.org/officeDocument/2006/relationships" xmlns:p="http://schemas.openxmlformats.org/presentationml/2006/main">
+  <p:cSld>
+    <p:spTree>
+      <p:nvGrpSpPr>
+        <p:cNvPr id="1" name=""/>
+        <p:cNvGrpSpPr/>
+        <p:nvPr/>
+      </p:nvGrpSpPr>
+      <p:grpSpPr>
+        <a:xfrm>
+          <a:off x="0" y="0"/>
+          <a:ext cx="0" cy="0"/>
+          <a:chOff x="0" y="0"/>
+          <a:chExt cx="0" cy="0"/>
+        </a:xfrm>
+      </p:grpSpPr>
+      <p:sp>
+        <p:nvSpPr>
+          <p:cNvPr id="2" name="Title 1">
+            <a:extLst>
+              <a:ext uri="{FF2B5EF4-FFF2-40B4-BE49-F238E27FC236}">
+                <a16:creationId xmlns:a16="http://schemas.microsoft.com/office/drawing/2014/main" id="{AB5388C1-5AE0-4716-AFB4-66240983AEC1}"/>
+              </a:ext>
+            </a:extLst>
+          </p:cNvPr>
+          <p:cNvSpPr>
+            <a:spLocks noGrp="1"/>
+          </p:cNvSpPr>
+          <p:nvPr>
+            <p:ph type="title"/>
+          </p:nvPr>
+        </p:nvSpPr>
+        <p:spPr/>
+        <p:txBody>
+          <a:bodyPr/>
+          <a:lstStyle/>
+          <a:p>
+            <a:r>
+              <a:rPr lang="en-US" dirty="0"/>
+              <a:t>Level class</a:t>
+            </a:r>
+          </a:p>
+        </p:txBody>
+      </p:sp>
+      <p:sp>
+        <p:nvSpPr>
+          <p:cNvPr id="3" name="Content Placeholder 2">
+            <a:extLst>
+              <a:ext uri="{FF2B5EF4-FFF2-40B4-BE49-F238E27FC236}">
+                <a16:creationId xmlns:a16="http://schemas.microsoft.com/office/drawing/2014/main" id="{95EE0EA3-6DE0-4F08-97C8-6615FB14E6EA}"/>
+              </a:ext>
+            </a:extLst>
+          </p:cNvPr>
+          <p:cNvSpPr>
+            <a:spLocks noGrp="1"/>
+          </p:cNvSpPr>
+          <p:nvPr>
+            <p:ph sz="half" idx="1"/>
+          </p:nvPr>
+        </p:nvSpPr>
+        <p:spPr/>
+        <p:txBody>
+          <a:bodyPr/>
+          <a:lstStyle/>
+          <a:p>
+            <a:r>
+              <a:rPr lang="en-US" dirty="0"/>
+              <a:t>Handles the various levels in the game. </a:t>
+            </a:r>
+          </a:p>
+          <a:p>
+            <a:pPr lvl="1"/>
+            <a:r>
+              <a:rPr lang="en-US" dirty="0"/>
+              <a:t>Game over </a:t>
+            </a:r>
+          </a:p>
+          <a:p>
+            <a:pPr lvl="1"/>
+            <a:r>
+              <a:rPr lang="en-US" dirty="0"/>
+              <a:t>Next level</a:t>
+            </a:r>
+          </a:p>
+        </p:txBody>
+      </p:sp>
+      <p:sp>
+        <p:nvSpPr>
+          <p:cNvPr id="4" name="Content Placeholder 3">
+            <a:extLst>
+              <a:ext uri="{FF2B5EF4-FFF2-40B4-BE49-F238E27FC236}">
+                <a16:creationId xmlns:a16="http://schemas.microsoft.com/office/drawing/2014/main" id="{4827A867-19BF-42E5-B704-8BEF273E5822}"/>
+              </a:ext>
+            </a:extLst>
+          </p:cNvPr>
+          <p:cNvSpPr>
+            <a:spLocks noGrp="1"/>
+          </p:cNvSpPr>
+          <p:nvPr>
+            <p:ph sz="half" idx="2"/>
+          </p:nvPr>
+        </p:nvSpPr>
+        <p:spPr/>
+        <p:txBody>
+          <a:bodyPr/>
+          <a:lstStyle/>
+          <a:p>
+            <a:endParaRPr lang="en-US"/>
+          </a:p>
+        </p:txBody>
+      </p:sp>
+    </p:spTree>
+    <p:extLst>
+      <p:ext uri="{BB962C8B-B14F-4D97-AF65-F5344CB8AC3E}">
+        <p14:creationId xmlns:p14="http://schemas.microsoft.com/office/powerpoint/2010/main" val="4265210884"/>
+      </p:ext>
+    </p:extLst>
+  </p:cSld>
+  <p:clrMapOvr>
+    <a:masterClrMapping/>
+  </p:clrMapOvr>
+</p:sld>
+</file>
+
+<file path=ppt/slides/slide6.xml><?xml version="1.0" encoding="utf-8"?>
+<p:sld xmlns:a="http://schemas.openxmlformats.org/drawingml/2006/main" xmlns:r="http://schemas.openxmlformats.org/officeDocument/2006/relationships" xmlns:p="http://schemas.openxmlformats.org/presentationml/2006/main">
+  <p:cSld>
+    <p:spTree>
+      <p:nvGrpSpPr>
+        <p:cNvPr id="1" name=""/>
+        <p:cNvGrpSpPr/>
+        <p:nvPr/>
+      </p:nvGrpSpPr>
+      <p:grpSpPr>
+        <a:xfrm>
+          <a:off x="0" y="0"/>
+          <a:ext cx="0" cy="0"/>
+          <a:chOff x="0" y="0"/>
+          <a:chExt cx="0" cy="0"/>
+        </a:xfrm>
+      </p:grpSpPr>
+      <p:sp>
+        <p:nvSpPr>
+          <p:cNvPr id="2" name="Title 1">
+            <a:extLst>
+              <a:ext uri="{FF2B5EF4-FFF2-40B4-BE49-F238E27FC236}">
+                <a16:creationId xmlns:a16="http://schemas.microsoft.com/office/drawing/2014/main" id="{E7006F5A-D609-41F0-A288-8EB32F171576}"/>
+              </a:ext>
+            </a:extLst>
+          </p:cNvPr>
+          <p:cNvSpPr>
+            <a:spLocks noGrp="1"/>
+          </p:cNvSpPr>
+          <p:nvPr>
+            <p:ph type="title"/>
+          </p:nvPr>
+        </p:nvSpPr>
+        <p:spPr/>
+        <p:txBody>
+          <a:bodyPr/>
+          <a:lstStyle/>
+          <a:p>
+            <a:r>
+              <a:rPr lang="en-US" dirty="0"/>
+              <a:t>Splash Screen class</a:t>
+            </a:r>
+          </a:p>
+        </p:txBody>
+      </p:sp>
+      <p:sp>
+        <p:nvSpPr>
+          <p:cNvPr id="3" name="Content Placeholder 2">
+            <a:extLst>
+              <a:ext uri="{FF2B5EF4-FFF2-40B4-BE49-F238E27FC236}">
+                <a16:creationId xmlns:a16="http://schemas.microsoft.com/office/drawing/2014/main" id="{45788C37-68FE-4782-B20C-1F0BA58AD48F}"/>
+              </a:ext>
+            </a:extLst>
+          </p:cNvPr>
+          <p:cNvSpPr>
+            <a:spLocks noGrp="1"/>
+          </p:cNvSpPr>
+          <p:nvPr>
+            <p:ph sz="half" idx="1"/>
+          </p:nvPr>
+        </p:nvSpPr>
+        <p:spPr/>
+        <p:txBody>
+          <a:bodyPr/>
+          <a:lstStyle/>
+          <a:p>
+            <a:r>
+              <a:rPr lang="en-US" dirty="0"/>
+              <a:t>Handle the various splash screens depending on the stage of the game the user is in.</a:t>
+            </a:r>
+          </a:p>
+          <a:p>
+            <a:pPr lvl="1"/>
+            <a:r>
+              <a:rPr lang="en-US" dirty="0"/>
+              <a:t>Start screen</a:t>
+            </a:r>
+          </a:p>
+          <a:p>
+            <a:pPr lvl="1"/>
+            <a:r>
+              <a:rPr lang="en-US" dirty="0"/>
+              <a:t>Level screens</a:t>
+            </a:r>
+          </a:p>
+          <a:p>
+            <a:pPr lvl="1"/>
+            <a:r>
+              <a:rPr lang="en-US" dirty="0"/>
+              <a:t>End screen</a:t>
+            </a:r>
+          </a:p>
+          <a:p>
+            <a:pPr lvl="1"/>
+            <a:r>
+              <a:rPr lang="en-US" dirty="0"/>
+              <a:t>Help Screen</a:t>
+            </a:r>
+          </a:p>
+        </p:txBody>
+      </p:sp>
+      <p:sp>
+        <p:nvSpPr>
+          <p:cNvPr id="4" name="Content Placeholder 3">
+            <a:extLst>
+              <a:ext uri="{FF2B5EF4-FFF2-40B4-BE49-F238E27FC236}">
+                <a16:creationId xmlns:a16="http://schemas.microsoft.com/office/drawing/2014/main" id="{F2A2E03C-2D2B-4D5A-8ED9-5D81B26E5527}"/>
+              </a:ext>
+            </a:extLst>
+          </p:cNvPr>
+          <p:cNvSpPr>
+            <a:spLocks noGrp="1"/>
+          </p:cNvSpPr>
+          <p:nvPr>
+            <p:ph sz="half" idx="2"/>
+          </p:nvPr>
+        </p:nvSpPr>
+        <p:spPr/>
+        <p:txBody>
+          <a:bodyPr/>
+          <a:lstStyle/>
+          <a:p>
+            <a:endParaRPr lang="en-US"/>
+          </a:p>
+        </p:txBody>
+      </p:sp>
+    </p:spTree>
+    <p:extLst>
+      <p:ext uri="{BB962C8B-B14F-4D97-AF65-F5344CB8AC3E}">
+        <p14:creationId xmlns:p14="http://schemas.microsoft.com/office/powerpoint/2010/main" val="3966481404"/>
+      </p:ext>
+    </p:extLst>
+  </p:cSld>
+  <p:clrMapOvr>
+    <a:masterClrMapping/>
+  </p:clrMapOvr>
+</p:sld>
+</file>
+
+<file path=ppt/slides/slide7.xml><?xml version="1.0" encoding="utf-8"?>
+<p:sld xmlns:a="http://schemas.openxmlformats.org/drawingml/2006/main" xmlns:r="http://schemas.openxmlformats.org/officeDocument/2006/relationships" xmlns:p="http://schemas.openxmlformats.org/presentationml/2006/main">
+  <p:cSld>
+    <p:spTree>
+      <p:nvGrpSpPr>
+        <p:cNvPr id="1" name=""/>
+        <p:cNvGrpSpPr/>
+        <p:nvPr/>
+      </p:nvGrpSpPr>
+      <p:grpSpPr>
+        <a:xfrm>
+          <a:off x="0" y="0"/>
+          <a:ext cx="0" cy="0"/>
+          <a:chOff x="0" y="0"/>
+          <a:chExt cx="0" cy="0"/>
+        </a:xfrm>
+      </p:grpSpPr>
+      <p:sp>
+        <p:nvSpPr>
+          <p:cNvPr id="2" name="Title 1">
+            <a:extLst>
+              <a:ext uri="{FF2B5EF4-FFF2-40B4-BE49-F238E27FC236}">
+                <a16:creationId xmlns:a16="http://schemas.microsoft.com/office/drawing/2014/main" id="{3EDBA5B3-1911-4268-A262-AD93A4E43626}"/>
+              </a:ext>
+            </a:extLst>
+          </p:cNvPr>
+          <p:cNvSpPr>
+            <a:spLocks noGrp="1"/>
+          </p:cNvSpPr>
+          <p:nvPr>
+            <p:ph type="title"/>
+          </p:nvPr>
+        </p:nvSpPr>
+        <p:spPr/>
+        <p:txBody>
+          <a:bodyPr/>
+          <a:lstStyle/>
+          <a:p>
+            <a:r>
+              <a:rPr lang="en-US" dirty="0"/>
+              <a:t>Director class</a:t>
+            </a:r>
+          </a:p>
+        </p:txBody>
+      </p:sp>
+      <p:sp>
+        <p:nvSpPr>
+          <p:cNvPr id="3" name="Content Placeholder 2">
+            <a:extLst>
+              <a:ext uri="{FF2B5EF4-FFF2-40B4-BE49-F238E27FC236}">
+                <a16:creationId xmlns:a16="http://schemas.microsoft.com/office/drawing/2014/main" id="{D6E67422-5A05-4F27-B3F8-F6157B1C9FD6}"/>
+              </a:ext>
+            </a:extLst>
+          </p:cNvPr>
+          <p:cNvSpPr>
+            <a:spLocks noGrp="1"/>
+          </p:cNvSpPr>
+          <p:nvPr>
+            <p:ph sz="half" idx="1"/>
+          </p:nvPr>
+        </p:nvSpPr>
+        <p:spPr/>
+        <p:txBody>
+          <a:bodyPr/>
+          <a:lstStyle/>
+          <a:p>
+            <a:r>
+              <a:rPr lang="en-US" dirty="0"/>
+              <a:t>The director handles the various game functions and maintains the game play.</a:t>
+            </a:r>
+          </a:p>
+        </p:txBody>
+      </p:sp>
+      <p:sp>
+        <p:nvSpPr>
+          <p:cNvPr id="4" name="Content Placeholder 3">
+            <a:extLst>
+              <a:ext uri="{FF2B5EF4-FFF2-40B4-BE49-F238E27FC236}">
+                <a16:creationId xmlns:a16="http://schemas.microsoft.com/office/drawing/2014/main" id="{FABD4366-B9F4-493A-9D07-4CE96CC763BA}"/>
+              </a:ext>
+            </a:extLst>
+          </p:cNvPr>
+          <p:cNvSpPr>
+            <a:spLocks noGrp="1"/>
+          </p:cNvSpPr>
+          <p:nvPr>
+            <p:ph sz="half" idx="2"/>
+          </p:nvPr>
+        </p:nvSpPr>
+        <p:spPr/>
+        <p:txBody>
+          <a:bodyPr/>
+          <a:lstStyle/>
+          <a:p>
+            <a:endParaRPr lang="en-US"/>
+          </a:p>
+        </p:txBody>
+      </p:sp>
+    </p:spTree>
+    <p:extLst>
+      <p:ext uri="{BB962C8B-B14F-4D97-AF65-F5344CB8AC3E}">
+        <p14:creationId xmlns:p14="http://schemas.microsoft.com/office/powerpoint/2010/main" val="321454203"/>
+      </p:ext>
+    </p:extLst>
+  </p:cSld>
+  <p:clrMapOvr>
+    <a:masterClrMapping/>
+  </p:clrMapOvr>
+</p:sld>
+</file>
+
+<file path=ppt/slides/slide8.xml><?xml version="1.0" encoding="utf-8"?>
+<p:sld xmlns:a="http://schemas.openxmlformats.org/drawingml/2006/main" xmlns:r="http://schemas.openxmlformats.org/officeDocument/2006/relationships" xmlns:p="http://schemas.openxmlformats.org/presentationml/2006/main">
+  <p:cSld>
+    <p:spTree>
+      <p:nvGrpSpPr>
+        <p:cNvPr id="1" name=""/>
+        <p:cNvGrpSpPr/>
+        <p:nvPr/>
+      </p:nvGrpSpPr>
+      <p:grpSpPr>
+        <a:xfrm>
+          <a:off x="0" y="0"/>
+          <a:ext cx="0" cy="0"/>
+          <a:chOff x="0" y="0"/>
+          <a:chExt cx="0" cy="0"/>
+        </a:xfrm>
+      </p:grpSpPr>
+      <p:sp>
+        <p:nvSpPr>
+          <p:cNvPr id="2" name="Title 1">
+            <a:extLst>
+              <a:ext uri="{FF2B5EF4-FFF2-40B4-BE49-F238E27FC236}">
+                <a16:creationId xmlns:a16="http://schemas.microsoft.com/office/drawing/2014/main" id="{60F5CA51-61B6-424A-BB01-6D439D4F93C5}"/>
+              </a:ext>
+            </a:extLst>
+          </p:cNvPr>
+          <p:cNvSpPr>
+            <a:spLocks noGrp="1"/>
+          </p:cNvSpPr>
+          <p:nvPr>
+            <p:ph type="title"/>
+          </p:nvPr>
+        </p:nvSpPr>
+        <p:spPr/>
+        <p:txBody>
+          <a:bodyPr/>
+          <a:lstStyle/>
+          <a:p>
+            <a:r>
+              <a:rPr lang="en-US" dirty="0"/>
+              <a:t>Constants class</a:t>
+            </a:r>
+          </a:p>
+        </p:txBody>
+      </p:sp>
+      <p:sp>
+        <p:nvSpPr>
+          <p:cNvPr id="3" name="Content Placeholder 2">
+            <a:extLst>
+              <a:ext uri="{FF2B5EF4-FFF2-40B4-BE49-F238E27FC236}">
+                <a16:creationId xmlns:a16="http://schemas.microsoft.com/office/drawing/2014/main" id="{9F39D27B-5BB0-425C-A2EF-022F7CF29A23}"/>
+              </a:ext>
+            </a:extLst>
+          </p:cNvPr>
+          <p:cNvSpPr>
+            <a:spLocks noGrp="1"/>
+          </p:cNvSpPr>
+          <p:nvPr>
+            <p:ph sz="half" idx="1"/>
+          </p:nvPr>
+        </p:nvSpPr>
+        <p:spPr/>
+        <p:txBody>
+          <a:bodyPr>
+            <a:normAutofit fontScale="92500" lnSpcReduction="20000"/>
+          </a:bodyPr>
+          <a:lstStyle/>
+          <a:p>
+            <a:r>
+              <a:rPr lang="en-US" dirty="0"/>
+              <a:t>All our game constants will live in here</a:t>
+            </a:r>
+          </a:p>
+          <a:p>
+            <a:pPr lvl="1"/>
+            <a:r>
+              <a:rPr lang="en-US" dirty="0"/>
+              <a:t>Screen width</a:t>
+            </a:r>
+          </a:p>
+          <a:p>
+            <a:pPr lvl="1"/>
+            <a:r>
+              <a:rPr lang="en-US" dirty="0"/>
+              <a:t>Screen Height</a:t>
+            </a:r>
+          </a:p>
+          <a:p>
+            <a:pPr lvl="1"/>
+            <a:r>
+              <a:rPr lang="en-US" dirty="0"/>
+              <a:t>Title</a:t>
+            </a:r>
+          </a:p>
+          <a:p>
+            <a:pPr lvl="1"/>
+            <a:r>
+              <a:rPr lang="en-US" dirty="0"/>
+              <a:t>Start location</a:t>
+            </a:r>
+          </a:p>
+          <a:p>
+            <a:pPr lvl="1"/>
+            <a:r>
+              <a:rPr lang="en-US" dirty="0"/>
+              <a:t>Max Lives</a:t>
+            </a:r>
+          </a:p>
+          <a:p>
+            <a:pPr lvl="1"/>
+            <a:r>
+              <a:rPr lang="en-US" dirty="0"/>
+              <a:t>File path to riddle folder</a:t>
+            </a:r>
+          </a:p>
+          <a:p>
+            <a:pPr lvl="1"/>
+            <a:r>
+              <a:rPr lang="en-US" dirty="0"/>
+              <a:t>Character Scaling</a:t>
+            </a:r>
+          </a:p>
+          <a:p>
+            <a:pPr lvl="1"/>
+            <a:r>
+              <a:rPr lang="en-US" dirty="0"/>
+              <a:t>Tile Scaling</a:t>
+            </a:r>
+          </a:p>
+          <a:p>
+            <a:pPr lvl="1"/>
+            <a:r>
+              <a:rPr lang="en-US" dirty="0"/>
+              <a:t>Coin Scaling </a:t>
+            </a:r>
+          </a:p>
+          <a:p>
+            <a:pPr lvl="1"/>
+            <a:r>
+              <a:rPr lang="en-US" dirty="0"/>
+              <a:t>Movement Speed</a:t>
+            </a:r>
+          </a:p>
+          <a:p>
+            <a:pPr lvl="1"/>
+            <a:r>
+              <a:rPr lang="en-US" dirty="0"/>
+              <a:t>Gravity</a:t>
+            </a:r>
+          </a:p>
+          <a:p>
+            <a:pPr lvl="1"/>
+            <a:r>
+              <a:rPr lang="en-US" dirty="0"/>
+              <a:t>Jump Speed</a:t>
+            </a:r>
+          </a:p>
+        </p:txBody>
+      </p:sp>
+      <p:sp>
+        <p:nvSpPr>
+          <p:cNvPr id="4" name="Content Placeholder 3">
+            <a:extLst>
+              <a:ext uri="{FF2B5EF4-FFF2-40B4-BE49-F238E27FC236}">
+                <a16:creationId xmlns:a16="http://schemas.microsoft.com/office/drawing/2014/main" id="{C512575D-0C42-46DF-B595-FF44E303F521}"/>
+              </a:ext>
+            </a:extLst>
+          </p:cNvPr>
+          <p:cNvSpPr>
+            <a:spLocks noGrp="1"/>
+          </p:cNvSpPr>
+          <p:nvPr>
+            <p:ph sz="half" idx="2"/>
+          </p:nvPr>
+        </p:nvSpPr>
+        <p:spPr/>
+        <p:txBody>
+          <a:bodyPr>
+            <a:normAutofit fontScale="92500" lnSpcReduction="20000"/>
+          </a:bodyPr>
+          <a:lstStyle/>
+          <a:p>
+            <a:endParaRPr lang="en-US"/>
+          </a:p>
+        </p:txBody>
+      </p:sp>
+    </p:spTree>
+    <p:extLst>
+      <p:ext uri="{BB962C8B-B14F-4D97-AF65-F5344CB8AC3E}">
+        <p14:creationId xmlns:p14="http://schemas.microsoft.com/office/powerpoint/2010/main" val="932568532"/>
+      </p:ext>
+    </p:extLst>
+  </p:cSld>
+  <p:clrMapOvr>
+    <a:masterClrMapping/>
+  </p:clrMapOvr>
+</p:sld>
+</file>
+
+<file path=ppt/slides/slide9.xml><?xml version="1.0" encoding="utf-8"?>
+<p:sld xmlns:a="http://schemas.openxmlformats.org/drawingml/2006/main" xmlns:r="http://schemas.openxmlformats.org/officeDocument/2006/relationships" xmlns:p="http://schemas.openxmlformats.org/presentationml/2006/main">
+  <p:cSld>
+    <p:spTree>
+      <p:nvGrpSpPr>
+        <p:cNvPr id="1" name=""/>
+        <p:cNvGrpSpPr/>
+        <p:nvPr/>
+      </p:nvGrpSpPr>
+      <p:grpSpPr>
+        <a:xfrm>
+          <a:off x="0" y="0"/>
+          <a:ext cx="0" cy="0"/>
+          <a:chOff x="0" y="0"/>
+          <a:chExt cx="0" cy="0"/>
+        </a:xfrm>
+      </p:grpSpPr>
+      <p:sp>
+        <p:nvSpPr>
+          <p:cNvPr id="2" name="Title 1">
+            <a:extLst>
+              <a:ext uri="{FF2B5EF4-FFF2-40B4-BE49-F238E27FC236}">
+                <a16:creationId xmlns:a16="http://schemas.microsoft.com/office/drawing/2014/main" id="{C4E993F9-FF22-44FA-9189-B3C30010754B}"/>
+              </a:ext>
+            </a:extLst>
+          </p:cNvPr>
+          <p:cNvSpPr>
+            <a:spLocks noGrp="1"/>
+          </p:cNvSpPr>
+          <p:nvPr>
+            <p:ph type="title"/>
+          </p:nvPr>
+        </p:nvSpPr>
+        <p:spPr/>
+        <p:txBody>
+          <a:bodyPr/>
+          <a:lstStyle/>
+          <a:p>
+            <a:r>
+              <a:rPr lang="en-US" dirty="0" err="1"/>
+              <a:t>Input_service</a:t>
+            </a:r>
+            <a:r>
+              <a:rPr lang="en-US" dirty="0"/>
+              <a:t> class</a:t>
+            </a:r>
+          </a:p>
+        </p:txBody>
+      </p:sp>
+      <p:sp>
+        <p:nvSpPr>
+          <p:cNvPr id="3" name="Content Placeholder 2">
+            <a:extLst>
+              <a:ext uri="{FF2B5EF4-FFF2-40B4-BE49-F238E27FC236}">
+                <a16:creationId xmlns:a16="http://schemas.microsoft.com/office/drawing/2014/main" id="{29F26100-1EB6-44E3-A057-15FFF0270DCF}"/>
+              </a:ext>
+            </a:extLst>
+          </p:cNvPr>
+          <p:cNvSpPr>
+            <a:spLocks noGrp="1"/>
+          </p:cNvSpPr>
+          <p:nvPr>
+            <p:ph sz="half" idx="1"/>
+          </p:nvPr>
+        </p:nvSpPr>
+        <p:spPr/>
+        <p:txBody>
+          <a:bodyPr/>
+          <a:lstStyle/>
+          <a:p>
+            <a:endParaRPr lang="en-US"/>
+          </a:p>
+        </p:txBody>
+      </p:sp>
+      <p:sp>
+        <p:nvSpPr>
+          <p:cNvPr id="4" name="Content Placeholder 3">
+            <a:extLst>
+              <a:ext uri="{FF2B5EF4-FFF2-40B4-BE49-F238E27FC236}">
+                <a16:creationId xmlns:a16="http://schemas.microsoft.com/office/drawing/2014/main" id="{84583010-6006-4F89-9FAE-C81CAC752783}"/>
+              </a:ext>
+            </a:extLst>
+          </p:cNvPr>
+          <p:cNvSpPr>
+            <a:spLocks noGrp="1"/>
+          </p:cNvSpPr>
+          <p:nvPr>
+            <p:ph sz="half" idx="2"/>
+          </p:nvPr>
+        </p:nvSpPr>
+        <p:spPr/>
+        <p:txBody>
+          <a:bodyPr/>
+          <a:lstStyle/>
+          <a:p>
+            <a:endParaRPr lang="en-US"/>
+          </a:p>
+        </p:txBody>
+      </p:sp>
+    </p:spTree>
+    <p:extLst>
+      <p:ext uri="{BB962C8B-B14F-4D97-AF65-F5344CB8AC3E}">
+        <p14:creationId xmlns:p14="http://schemas.microsoft.com/office/powerpoint/2010/main" val="3522928421"/>
       </p:ext>
     </p:extLst>
   </p:cSld>

</xml_diff>

<commit_message>
Changes to the CRC cards
</commit_message>
<xml_diff>
--- a/docs/The Heroic V (Five).pptx
+++ b/docs/The Heroic V (Five).pptx
@@ -7,15 +7,16 @@
   <p:sldIdLst>
     <p:sldId id="256" r:id="rId2"/>
     <p:sldId id="257" r:id="rId3"/>
-    <p:sldId id="258" r:id="rId4"/>
-    <p:sldId id="262" r:id="rId5"/>
-    <p:sldId id="266" r:id="rId6"/>
-    <p:sldId id="267" r:id="rId7"/>
-    <p:sldId id="268" r:id="rId8"/>
-    <p:sldId id="269" r:id="rId9"/>
-    <p:sldId id="263" r:id="rId10"/>
-    <p:sldId id="264" r:id="rId11"/>
-    <p:sldId id="265" r:id="rId12"/>
+    <p:sldId id="270" r:id="rId4"/>
+    <p:sldId id="258" r:id="rId5"/>
+    <p:sldId id="262" r:id="rId6"/>
+    <p:sldId id="266" r:id="rId7"/>
+    <p:sldId id="267" r:id="rId8"/>
+    <p:sldId id="268" r:id="rId9"/>
+    <p:sldId id="269" r:id="rId10"/>
+    <p:sldId id="263" r:id="rId11"/>
+    <p:sldId id="264" r:id="rId12"/>
+    <p:sldId id="265" r:id="rId13"/>
   </p:sldIdLst>
   <p:sldSz cx="12192000" cy="6858000"/>
   <p:notesSz cx="6858000" cy="9144000"/>
@@ -151,7 +152,7 @@
   <pc:docChgLst>
     <pc:chgData name="Josh Wassum" userId="fb6265fc5b84bcfc" providerId="LiveId" clId="{D1057FF6-79D2-4C5B-ADE7-009935E73ACB}"/>
     <pc:docChg chg="custSel addSld delSld modSld">
-      <pc:chgData name="Josh Wassum" userId="fb6265fc5b84bcfc" providerId="LiveId" clId="{D1057FF6-79D2-4C5B-ADE7-009935E73ACB}" dt="2021-11-13T03:34:51.842" v="1038" actId="20577"/>
+      <pc:chgData name="Josh Wassum" userId="fb6265fc5b84bcfc" providerId="LiveId" clId="{D1057FF6-79D2-4C5B-ADE7-009935E73ACB}" dt="2021-11-18T02:12:34.654" v="1493" actId="20577"/>
       <pc:docMkLst>
         <pc:docMk/>
       </pc:docMkLst>
@@ -398,6 +399,29 @@
           </ac:spMkLst>
         </pc:spChg>
       </pc:sldChg>
+      <pc:sldChg chg="modSp new mod">
+        <pc:chgData name="Josh Wassum" userId="fb6265fc5b84bcfc" providerId="LiveId" clId="{D1057FF6-79D2-4C5B-ADE7-009935E73ACB}" dt="2021-11-18T02:12:34.654" v="1493" actId="20577"/>
+        <pc:sldMkLst>
+          <pc:docMk/>
+          <pc:sldMk cId="889164962" sldId="270"/>
+        </pc:sldMkLst>
+        <pc:spChg chg="mod">
+          <ac:chgData name="Josh Wassum" userId="fb6265fc5b84bcfc" providerId="LiveId" clId="{D1057FF6-79D2-4C5B-ADE7-009935E73ACB}" dt="2021-11-18T01:38:46.592" v="1077" actId="20577"/>
+          <ac:spMkLst>
+            <pc:docMk/>
+            <pc:sldMk cId="889164962" sldId="270"/>
+            <ac:spMk id="2" creationId="{A0136985-2F78-47FF-9755-347FEEE0B44B}"/>
+          </ac:spMkLst>
+        </pc:spChg>
+        <pc:spChg chg="mod">
+          <ac:chgData name="Josh Wassum" userId="fb6265fc5b84bcfc" providerId="LiveId" clId="{D1057FF6-79D2-4C5B-ADE7-009935E73ACB}" dt="2021-11-18T02:12:34.654" v="1493" actId="20577"/>
+          <ac:spMkLst>
+            <pc:docMk/>
+            <pc:sldMk cId="889164962" sldId="270"/>
+            <ac:spMk id="3" creationId="{068474E2-5FE3-47BF-917D-C3CB28D44414}"/>
+          </ac:spMkLst>
+        </pc:spChg>
+      </pc:sldChg>
     </pc:docChg>
   </pc:docChgLst>
 </pc:chgInfo>
@@ -550,7 +574,7 @@
           <a:p>
             <a:fld id="{5E070E7C-C41D-4186-9D77-646936151585}" type="datetimeFigureOut">
               <a:rPr lang="en-US" smtClean="0"/>
-              <a:t>11/12/2021</a:t>
+              <a:t>11/17/2021</a:t>
             </a:fld>
             <a:endParaRPr lang="en-US"/>
           </a:p>
@@ -748,7 +772,7 @@
           <a:p>
             <a:fld id="{5E070E7C-C41D-4186-9D77-646936151585}" type="datetimeFigureOut">
               <a:rPr lang="en-US" smtClean="0"/>
-              <a:t>11/12/2021</a:t>
+              <a:t>11/17/2021</a:t>
             </a:fld>
             <a:endParaRPr lang="en-US"/>
           </a:p>
@@ -956,7 +980,7 @@
           <a:p>
             <a:fld id="{5E070E7C-C41D-4186-9D77-646936151585}" type="datetimeFigureOut">
               <a:rPr lang="en-US" smtClean="0"/>
-              <a:t>11/12/2021</a:t>
+              <a:t>11/17/2021</a:t>
             </a:fld>
             <a:endParaRPr lang="en-US"/>
           </a:p>
@@ -1154,7 +1178,7 @@
           <a:p>
             <a:fld id="{5E070E7C-C41D-4186-9D77-646936151585}" type="datetimeFigureOut">
               <a:rPr lang="en-US" smtClean="0"/>
-              <a:t>11/12/2021</a:t>
+              <a:t>11/17/2021</a:t>
             </a:fld>
             <a:endParaRPr lang="en-US"/>
           </a:p>
@@ -1429,7 +1453,7 @@
           <a:p>
             <a:fld id="{5E070E7C-C41D-4186-9D77-646936151585}" type="datetimeFigureOut">
               <a:rPr lang="en-US" smtClean="0"/>
-              <a:t>11/12/2021</a:t>
+              <a:t>11/17/2021</a:t>
             </a:fld>
             <a:endParaRPr lang="en-US"/>
           </a:p>
@@ -1694,7 +1718,7 @@
           <a:p>
             <a:fld id="{5E070E7C-C41D-4186-9D77-646936151585}" type="datetimeFigureOut">
               <a:rPr lang="en-US" smtClean="0"/>
-              <a:t>11/12/2021</a:t>
+              <a:t>11/17/2021</a:t>
             </a:fld>
             <a:endParaRPr lang="en-US"/>
           </a:p>
@@ -2106,7 +2130,7 @@
           <a:p>
             <a:fld id="{5E070E7C-C41D-4186-9D77-646936151585}" type="datetimeFigureOut">
               <a:rPr lang="en-US" smtClean="0"/>
-              <a:t>11/12/2021</a:t>
+              <a:t>11/17/2021</a:t>
             </a:fld>
             <a:endParaRPr lang="en-US"/>
           </a:p>
@@ -2247,7 +2271,7 @@
           <a:p>
             <a:fld id="{5E070E7C-C41D-4186-9D77-646936151585}" type="datetimeFigureOut">
               <a:rPr lang="en-US" smtClean="0"/>
-              <a:t>11/12/2021</a:t>
+              <a:t>11/17/2021</a:t>
             </a:fld>
             <a:endParaRPr lang="en-US"/>
           </a:p>
@@ -2360,7 +2384,7 @@
           <a:p>
             <a:fld id="{5E070E7C-C41D-4186-9D77-646936151585}" type="datetimeFigureOut">
               <a:rPr lang="en-US" smtClean="0"/>
-              <a:t>11/12/2021</a:t>
+              <a:t>11/17/2021</a:t>
             </a:fld>
             <a:endParaRPr lang="en-US"/>
           </a:p>
@@ -2671,7 +2695,7 @@
           <a:p>
             <a:fld id="{5E070E7C-C41D-4186-9D77-646936151585}" type="datetimeFigureOut">
               <a:rPr lang="en-US" smtClean="0"/>
-              <a:t>11/12/2021</a:t>
+              <a:t>11/17/2021</a:t>
             </a:fld>
             <a:endParaRPr lang="en-US"/>
           </a:p>
@@ -2959,7 +2983,7 @@
           <a:p>
             <a:fld id="{5E070E7C-C41D-4186-9D77-646936151585}" type="datetimeFigureOut">
               <a:rPr lang="en-US" smtClean="0"/>
-              <a:t>11/12/2021</a:t>
+              <a:t>11/17/2021</a:t>
             </a:fld>
             <a:endParaRPr lang="en-US"/>
           </a:p>
@@ -3200,7 +3224,7 @@
           <a:p>
             <a:fld id="{5E070E7C-C41D-4186-9D77-646936151585}" type="datetimeFigureOut">
               <a:rPr lang="en-US" smtClean="0"/>
-              <a:t>11/12/2021</a:t>
+              <a:t>11/17/2021</a:t>
             </a:fld>
             <a:endParaRPr lang="en-US"/>
           </a:p>
@@ -3708,6 +3732,118 @@
           <p:cNvPr id="2" name="Title 1">
             <a:extLst>
               <a:ext uri="{FF2B5EF4-FFF2-40B4-BE49-F238E27FC236}">
+                <a16:creationId xmlns:a16="http://schemas.microsoft.com/office/drawing/2014/main" id="{C4E993F9-FF22-44FA-9189-B3C30010754B}"/>
+              </a:ext>
+            </a:extLst>
+          </p:cNvPr>
+          <p:cNvSpPr>
+            <a:spLocks noGrp="1"/>
+          </p:cNvSpPr>
+          <p:nvPr>
+            <p:ph type="title"/>
+          </p:nvPr>
+        </p:nvSpPr>
+        <p:spPr/>
+        <p:txBody>
+          <a:bodyPr/>
+          <a:lstStyle/>
+          <a:p>
+            <a:r>
+              <a:rPr lang="en-US" dirty="0" err="1"/>
+              <a:t>Input_service</a:t>
+            </a:r>
+            <a:r>
+              <a:rPr lang="en-US" dirty="0"/>
+              <a:t> class</a:t>
+            </a:r>
+          </a:p>
+        </p:txBody>
+      </p:sp>
+      <p:sp>
+        <p:nvSpPr>
+          <p:cNvPr id="3" name="Content Placeholder 2">
+            <a:extLst>
+              <a:ext uri="{FF2B5EF4-FFF2-40B4-BE49-F238E27FC236}">
+                <a16:creationId xmlns:a16="http://schemas.microsoft.com/office/drawing/2014/main" id="{29F26100-1EB6-44E3-A057-15FFF0270DCF}"/>
+              </a:ext>
+            </a:extLst>
+          </p:cNvPr>
+          <p:cNvSpPr>
+            <a:spLocks noGrp="1"/>
+          </p:cNvSpPr>
+          <p:nvPr>
+            <p:ph sz="half" idx="1"/>
+          </p:nvPr>
+        </p:nvSpPr>
+        <p:spPr/>
+        <p:txBody>
+          <a:bodyPr/>
+          <a:lstStyle/>
+          <a:p>
+            <a:endParaRPr lang="en-US"/>
+          </a:p>
+        </p:txBody>
+      </p:sp>
+      <p:sp>
+        <p:nvSpPr>
+          <p:cNvPr id="4" name="Content Placeholder 3">
+            <a:extLst>
+              <a:ext uri="{FF2B5EF4-FFF2-40B4-BE49-F238E27FC236}">
+                <a16:creationId xmlns:a16="http://schemas.microsoft.com/office/drawing/2014/main" id="{84583010-6006-4F89-9FAE-C81CAC752783}"/>
+              </a:ext>
+            </a:extLst>
+          </p:cNvPr>
+          <p:cNvSpPr>
+            <a:spLocks noGrp="1"/>
+          </p:cNvSpPr>
+          <p:nvPr>
+            <p:ph sz="half" idx="2"/>
+          </p:nvPr>
+        </p:nvSpPr>
+        <p:spPr/>
+        <p:txBody>
+          <a:bodyPr/>
+          <a:lstStyle/>
+          <a:p>
+            <a:endParaRPr lang="en-US"/>
+          </a:p>
+        </p:txBody>
+      </p:sp>
+    </p:spTree>
+    <p:extLst>
+      <p:ext uri="{BB962C8B-B14F-4D97-AF65-F5344CB8AC3E}">
+        <p14:creationId xmlns:p14="http://schemas.microsoft.com/office/powerpoint/2010/main" val="3522928421"/>
+      </p:ext>
+    </p:extLst>
+  </p:cSld>
+  <p:clrMapOvr>
+    <a:masterClrMapping/>
+  </p:clrMapOvr>
+</p:sld>
+</file>
+
+<file path=ppt/slides/slide11.xml><?xml version="1.0" encoding="utf-8"?>
+<p:sld xmlns:a="http://schemas.openxmlformats.org/drawingml/2006/main" xmlns:r="http://schemas.openxmlformats.org/officeDocument/2006/relationships" xmlns:p="http://schemas.openxmlformats.org/presentationml/2006/main">
+  <p:cSld>
+    <p:spTree>
+      <p:nvGrpSpPr>
+        <p:cNvPr id="1" name=""/>
+        <p:cNvGrpSpPr/>
+        <p:nvPr/>
+      </p:nvGrpSpPr>
+      <p:grpSpPr>
+        <a:xfrm>
+          <a:off x="0" y="0"/>
+          <a:ext cx="0" cy="0"/>
+          <a:chOff x="0" y="0"/>
+          <a:chExt cx="0" cy="0"/>
+        </a:xfrm>
+      </p:grpSpPr>
+      <p:sp>
+        <p:nvSpPr>
+          <p:cNvPr id="2" name="Title 1">
+            <a:extLst>
+              <a:ext uri="{FF2B5EF4-FFF2-40B4-BE49-F238E27FC236}">
                 <a16:creationId xmlns:a16="http://schemas.microsoft.com/office/drawing/2014/main" id="{955D95A7-A4BC-4F2B-9B1E-A1FCF2328B55}"/>
               </a:ext>
             </a:extLst>
@@ -3798,7 +3934,7 @@
 </p:sld>
 </file>
 
-<file path=ppt/slides/slide11.xml><?xml version="1.0" encoding="utf-8"?>
+<file path=ppt/slides/slide12.xml><?xml version="1.0" encoding="utf-8"?>
 <p:sld xmlns:a="http://schemas.openxmlformats.org/drawingml/2006/main" xmlns:r="http://schemas.openxmlformats.org/officeDocument/2006/relationships" xmlns:p="http://schemas.openxmlformats.org/presentationml/2006/main">
   <p:cSld>
     <p:spTree>
@@ -4312,7 +4448,7 @@
           <p:cNvPr id="2" name="Title 1">
             <a:extLst>
               <a:ext uri="{FF2B5EF4-FFF2-40B4-BE49-F238E27FC236}">
-                <a16:creationId xmlns:a16="http://schemas.microsoft.com/office/drawing/2014/main" id="{D0CD6F19-E431-4C3E-B6A9-6CBE81FFF6DC}"/>
+                <a16:creationId xmlns:a16="http://schemas.microsoft.com/office/drawing/2014/main" id="{A0136985-2F78-47FF-9755-347FEEE0B44B}"/>
               </a:ext>
             </a:extLst>
           </p:cNvPr>
@@ -4330,7 +4466,7 @@
           <a:p>
             <a:r>
               <a:rPr lang="en-US" dirty="0"/>
-              <a:t>Actor Class</a:t>
+              <a:t>Week 10 Assignments – Alpha Release</a:t>
             </a:r>
           </a:p>
         </p:txBody>
@@ -4340,90 +4476,120 @@
           <p:cNvPr id="3" name="Content Placeholder 2">
             <a:extLst>
               <a:ext uri="{FF2B5EF4-FFF2-40B4-BE49-F238E27FC236}">
-                <a16:creationId xmlns:a16="http://schemas.microsoft.com/office/drawing/2014/main" id="{0CB11699-6128-4BB2-93D6-8B254326185E}"/>
-              </a:ext>
-            </a:extLst>
-          </p:cNvPr>
-          <p:cNvSpPr>
-            <a:spLocks noGrp="1"/>
-          </p:cNvSpPr>
-          <p:nvPr>
-            <p:ph sz="half" idx="1"/>
-          </p:nvPr>
-        </p:nvSpPr>
-        <p:spPr/>
-        <p:txBody>
-          <a:bodyPr/>
-          <a:lstStyle/>
-          <a:p>
-            <a:r>
-              <a:rPr lang="en-US" dirty="0"/>
-              <a:t>Houses the basic functions for our in-game objects.</a:t>
+                <a16:creationId xmlns:a16="http://schemas.microsoft.com/office/drawing/2014/main" id="{068474E2-5FE3-47BF-917D-C3CB28D44414}"/>
+              </a:ext>
+            </a:extLst>
+          </p:cNvPr>
+          <p:cNvSpPr>
+            <a:spLocks noGrp="1"/>
+          </p:cNvSpPr>
+          <p:nvPr>
+            <p:ph idx="1"/>
+          </p:nvPr>
+        </p:nvSpPr>
+        <p:spPr/>
+        <p:txBody>
+          <a:bodyPr>
+            <a:normAutofit fontScale="70000" lnSpcReduction="20000"/>
+          </a:bodyPr>
+          <a:lstStyle/>
+          <a:p>
+            <a:r>
+              <a:rPr lang="en-US" dirty="0"/>
+              <a:t>__main__.py - Group</a:t>
+            </a:r>
+          </a:p>
+          <a:p>
+            <a:r>
+              <a:rPr lang="en-US" dirty="0"/>
+              <a:t>Actor.py - Brian</a:t>
             </a:r>
           </a:p>
           <a:p>
             <a:pPr lvl="1"/>
             <a:r>
               <a:rPr lang="en-US" dirty="0"/>
-              <a:t>Player</a:t>
+              <a:t>Character - main</a:t>
             </a:r>
           </a:p>
           <a:p>
             <a:pPr lvl="1"/>
             <a:r>
               <a:rPr lang="en-US" dirty="0"/>
-              <a:t>Coins</a:t>
+              <a:t>Platform - main</a:t>
             </a:r>
           </a:p>
           <a:p>
             <a:pPr lvl="1"/>
             <a:r>
               <a:rPr lang="en-US" dirty="0"/>
-              <a:t>Platform</a:t>
+              <a:t>Coins - main</a:t>
             </a:r>
           </a:p>
           <a:p>
             <a:pPr lvl="1"/>
             <a:r>
-              <a:rPr lang="en-US" dirty="0" err="1"/>
-              <a:t>Riddlemaster</a:t>
-            </a:r>
-            <a:endParaRPr lang="en-US" dirty="0"/>
-          </a:p>
-          <a:p>
-            <a:endParaRPr lang="en-US" dirty="0"/>
-          </a:p>
-        </p:txBody>
-      </p:sp>
-      <p:sp>
-        <p:nvSpPr>
-          <p:cNvPr id="4" name="Content Placeholder 3">
-            <a:extLst>
-              <a:ext uri="{FF2B5EF4-FFF2-40B4-BE49-F238E27FC236}">
-                <a16:creationId xmlns:a16="http://schemas.microsoft.com/office/drawing/2014/main" id="{68D0340F-C841-4A7D-A192-BE0B8A147F8A}"/>
-              </a:ext>
-            </a:extLst>
-          </p:cNvPr>
-          <p:cNvSpPr>
-            <a:spLocks noGrp="1"/>
-          </p:cNvSpPr>
-          <p:nvPr>
-            <p:ph sz="half" idx="2"/>
-          </p:nvPr>
-        </p:nvSpPr>
-        <p:spPr/>
-        <p:txBody>
-          <a:bodyPr/>
-          <a:lstStyle/>
-          <a:p>
-            <a:endParaRPr lang="en-US"/>
+              <a:rPr lang="en-US" dirty="0"/>
+              <a:t>Points - main</a:t>
+            </a:r>
+          </a:p>
+          <a:p>
+            <a:r>
+              <a:rPr lang="en-US" dirty="0"/>
+              <a:t>Action.py - Group</a:t>
+            </a:r>
+          </a:p>
+          <a:p>
+            <a:pPr lvl="1"/>
+            <a:r>
+              <a:rPr lang="en-US" dirty="0"/>
+              <a:t>Handle_colisions_action.py - Larry</a:t>
+            </a:r>
+          </a:p>
+          <a:p>
+            <a:pPr lvl="1"/>
+            <a:r>
+              <a:rPr lang="en-US" dirty="0"/>
+              <a:t>Draw_actors_action.py – Vanessa</a:t>
+            </a:r>
+          </a:p>
+          <a:p>
+            <a:pPr lvl="1"/>
+            <a:r>
+              <a:rPr lang="en-US" dirty="0"/>
+              <a:t>Move_actors_action.py - Shane</a:t>
+            </a:r>
+          </a:p>
+          <a:p>
+            <a:r>
+              <a:rPr lang="en-US" dirty="0"/>
+              <a:t>Constants.py - Group</a:t>
+            </a:r>
+          </a:p>
+          <a:p>
+            <a:r>
+              <a:rPr lang="en-US" dirty="0"/>
+              <a:t>Input_service.py - Josh</a:t>
+            </a:r>
+          </a:p>
+          <a:p>
+            <a:r>
+              <a:rPr lang="en-US" dirty="0"/>
+              <a:t>Output_service.py - Josh</a:t>
+            </a:r>
+          </a:p>
+          <a:p>
+            <a:r>
+              <a:rPr lang="en-US" dirty="0"/>
+              <a:t>Director.py - Josh</a:t>
+            </a:r>
           </a:p>
         </p:txBody>
       </p:sp>
     </p:spTree>
     <p:extLst>
       <p:ext uri="{BB962C8B-B14F-4D97-AF65-F5344CB8AC3E}">
-        <p14:creationId xmlns:p14="http://schemas.microsoft.com/office/powerpoint/2010/main" val="2918679572"/>
+        <p14:creationId xmlns:p14="http://schemas.microsoft.com/office/powerpoint/2010/main" val="889164962"/>
       </p:ext>
     </p:extLst>
   </p:cSld>
@@ -4455,7 +4621,7 @@
           <p:cNvPr id="2" name="Title 1">
             <a:extLst>
               <a:ext uri="{FF2B5EF4-FFF2-40B4-BE49-F238E27FC236}">
-                <a16:creationId xmlns:a16="http://schemas.microsoft.com/office/drawing/2014/main" id="{8DFEFBEA-A69A-4C80-8825-185F73FA9652}"/>
+                <a16:creationId xmlns:a16="http://schemas.microsoft.com/office/drawing/2014/main" id="{D0CD6F19-E431-4C3E-B6A9-6CBE81FFF6DC}"/>
               </a:ext>
             </a:extLst>
           </p:cNvPr>
@@ -4473,7 +4639,7 @@
           <a:p>
             <a:r>
               <a:rPr lang="en-US" dirty="0"/>
-              <a:t>Action class</a:t>
+              <a:t>Actor Class</a:t>
             </a:r>
           </a:p>
         </p:txBody>
@@ -4483,7 +4649,7 @@
           <p:cNvPr id="3" name="Content Placeholder 2">
             <a:extLst>
               <a:ext uri="{FF2B5EF4-FFF2-40B4-BE49-F238E27FC236}">
-                <a16:creationId xmlns:a16="http://schemas.microsoft.com/office/drawing/2014/main" id="{4ED4F2F8-5406-44F0-9D7A-369941F8B9FC}"/>
+                <a16:creationId xmlns:a16="http://schemas.microsoft.com/office/drawing/2014/main" id="{0CB11699-6128-4BB2-93D6-8B254326185E}"/>
               </a:ext>
             </a:extLst>
           </p:cNvPr>
@@ -4501,29 +4667,40 @@
           <a:p>
             <a:r>
               <a:rPr lang="en-US" dirty="0"/>
-              <a:t>Handle in game actions that the user or in game objects might take.</a:t>
+              <a:t>Houses the basic functions for our in-game objects.</a:t>
             </a:r>
           </a:p>
           <a:p>
             <a:pPr lvl="1"/>
             <a:r>
               <a:rPr lang="en-US" dirty="0"/>
-              <a:t>Handle Collisions</a:t>
+              <a:t>Player</a:t>
             </a:r>
           </a:p>
           <a:p>
             <a:pPr lvl="1"/>
             <a:r>
               <a:rPr lang="en-US" dirty="0"/>
-              <a:t>Draw actors action</a:t>
+              <a:t>Coins</a:t>
             </a:r>
           </a:p>
           <a:p>
             <a:pPr lvl="1"/>
             <a:r>
               <a:rPr lang="en-US" dirty="0"/>
-              <a:t>Control actors action</a:t>
-            </a:r>
+              <a:t>Platform</a:t>
+            </a:r>
+          </a:p>
+          <a:p>
+            <a:pPr lvl="1"/>
+            <a:r>
+              <a:rPr lang="en-US" dirty="0" err="1"/>
+              <a:t>Riddlemaster</a:t>
+            </a:r>
+            <a:endParaRPr lang="en-US" dirty="0"/>
+          </a:p>
+          <a:p>
+            <a:endParaRPr lang="en-US" dirty="0"/>
           </a:p>
         </p:txBody>
       </p:sp>
@@ -4532,7 +4709,7 @@
           <p:cNvPr id="4" name="Content Placeholder 3">
             <a:extLst>
               <a:ext uri="{FF2B5EF4-FFF2-40B4-BE49-F238E27FC236}">
-                <a16:creationId xmlns:a16="http://schemas.microsoft.com/office/drawing/2014/main" id="{6EEF2990-019F-43B1-AA82-E449F7BA2D4C}"/>
+                <a16:creationId xmlns:a16="http://schemas.microsoft.com/office/drawing/2014/main" id="{68D0340F-C841-4A7D-A192-BE0B8A147F8A}"/>
               </a:ext>
             </a:extLst>
           </p:cNvPr>
@@ -4555,7 +4732,7 @@
     </p:spTree>
     <p:extLst>
       <p:ext uri="{BB962C8B-B14F-4D97-AF65-F5344CB8AC3E}">
-        <p14:creationId xmlns:p14="http://schemas.microsoft.com/office/powerpoint/2010/main" val="4167330972"/>
+        <p14:creationId xmlns:p14="http://schemas.microsoft.com/office/powerpoint/2010/main" val="2918679572"/>
       </p:ext>
     </p:extLst>
   </p:cSld>
@@ -4587,7 +4764,7 @@
           <p:cNvPr id="2" name="Title 1">
             <a:extLst>
               <a:ext uri="{FF2B5EF4-FFF2-40B4-BE49-F238E27FC236}">
-                <a16:creationId xmlns:a16="http://schemas.microsoft.com/office/drawing/2014/main" id="{AB5388C1-5AE0-4716-AFB4-66240983AEC1}"/>
+                <a16:creationId xmlns:a16="http://schemas.microsoft.com/office/drawing/2014/main" id="{8DFEFBEA-A69A-4C80-8825-185F73FA9652}"/>
               </a:ext>
             </a:extLst>
           </p:cNvPr>
@@ -4605,7 +4782,7 @@
           <a:p>
             <a:r>
               <a:rPr lang="en-US" dirty="0"/>
-              <a:t>Level class</a:t>
+              <a:t>Action class</a:t>
             </a:r>
           </a:p>
         </p:txBody>
@@ -4615,7 +4792,7 @@
           <p:cNvPr id="3" name="Content Placeholder 2">
             <a:extLst>
               <a:ext uri="{FF2B5EF4-FFF2-40B4-BE49-F238E27FC236}">
-                <a16:creationId xmlns:a16="http://schemas.microsoft.com/office/drawing/2014/main" id="{95EE0EA3-6DE0-4F08-97C8-6615FB14E6EA}"/>
+                <a16:creationId xmlns:a16="http://schemas.microsoft.com/office/drawing/2014/main" id="{4ED4F2F8-5406-44F0-9D7A-369941F8B9FC}"/>
               </a:ext>
             </a:extLst>
           </p:cNvPr>
@@ -4633,21 +4810,28 @@
           <a:p>
             <a:r>
               <a:rPr lang="en-US" dirty="0"/>
-              <a:t>Handles the various levels in the game. </a:t>
+              <a:t>Handle in game actions that the user or in game objects might take.</a:t>
             </a:r>
           </a:p>
           <a:p>
             <a:pPr lvl="1"/>
             <a:r>
               <a:rPr lang="en-US" dirty="0"/>
-              <a:t>Game over </a:t>
+              <a:t>Handle Collisions</a:t>
             </a:r>
           </a:p>
           <a:p>
             <a:pPr lvl="1"/>
             <a:r>
               <a:rPr lang="en-US" dirty="0"/>
-              <a:t>Next level</a:t>
+              <a:t>Draw actors action</a:t>
+            </a:r>
+          </a:p>
+          <a:p>
+            <a:pPr lvl="1"/>
+            <a:r>
+              <a:rPr lang="en-US" dirty="0"/>
+              <a:t>Control actors action</a:t>
             </a:r>
           </a:p>
         </p:txBody>
@@ -4657,7 +4841,7 @@
           <p:cNvPr id="4" name="Content Placeholder 3">
             <a:extLst>
               <a:ext uri="{FF2B5EF4-FFF2-40B4-BE49-F238E27FC236}">
-                <a16:creationId xmlns:a16="http://schemas.microsoft.com/office/drawing/2014/main" id="{4827A867-19BF-42E5-B704-8BEF273E5822}"/>
+                <a16:creationId xmlns:a16="http://schemas.microsoft.com/office/drawing/2014/main" id="{6EEF2990-019F-43B1-AA82-E449F7BA2D4C}"/>
               </a:ext>
             </a:extLst>
           </p:cNvPr>
@@ -4680,7 +4864,7 @@
     </p:spTree>
     <p:extLst>
       <p:ext uri="{BB962C8B-B14F-4D97-AF65-F5344CB8AC3E}">
-        <p14:creationId xmlns:p14="http://schemas.microsoft.com/office/powerpoint/2010/main" val="4265210884"/>
+        <p14:creationId xmlns:p14="http://schemas.microsoft.com/office/powerpoint/2010/main" val="4167330972"/>
       </p:ext>
     </p:extLst>
   </p:cSld>
@@ -4712,7 +4896,7 @@
           <p:cNvPr id="2" name="Title 1">
             <a:extLst>
               <a:ext uri="{FF2B5EF4-FFF2-40B4-BE49-F238E27FC236}">
-                <a16:creationId xmlns:a16="http://schemas.microsoft.com/office/drawing/2014/main" id="{E7006F5A-D609-41F0-A288-8EB32F171576}"/>
+                <a16:creationId xmlns:a16="http://schemas.microsoft.com/office/drawing/2014/main" id="{AB5388C1-5AE0-4716-AFB4-66240983AEC1}"/>
               </a:ext>
             </a:extLst>
           </p:cNvPr>
@@ -4730,7 +4914,7 @@
           <a:p>
             <a:r>
               <a:rPr lang="en-US" dirty="0"/>
-              <a:t>Splash Screen class</a:t>
+              <a:t>Level class</a:t>
             </a:r>
           </a:p>
         </p:txBody>
@@ -4740,7 +4924,7 @@
           <p:cNvPr id="3" name="Content Placeholder 2">
             <a:extLst>
               <a:ext uri="{FF2B5EF4-FFF2-40B4-BE49-F238E27FC236}">
-                <a16:creationId xmlns:a16="http://schemas.microsoft.com/office/drawing/2014/main" id="{45788C37-68FE-4782-B20C-1F0BA58AD48F}"/>
+                <a16:creationId xmlns:a16="http://schemas.microsoft.com/office/drawing/2014/main" id="{95EE0EA3-6DE0-4F08-97C8-6615FB14E6EA}"/>
               </a:ext>
             </a:extLst>
           </p:cNvPr>
@@ -4758,35 +4942,21 @@
           <a:p>
             <a:r>
               <a:rPr lang="en-US" dirty="0"/>
-              <a:t>Handle the various splash screens depending on the stage of the game the user is in.</a:t>
+              <a:t>Handles the various levels in the game. </a:t>
             </a:r>
           </a:p>
           <a:p>
             <a:pPr lvl="1"/>
             <a:r>
               <a:rPr lang="en-US" dirty="0"/>
-              <a:t>Start screen</a:t>
+              <a:t>Game over </a:t>
             </a:r>
           </a:p>
           <a:p>
             <a:pPr lvl="1"/>
             <a:r>
               <a:rPr lang="en-US" dirty="0"/>
-              <a:t>Level screens</a:t>
-            </a:r>
-          </a:p>
-          <a:p>
-            <a:pPr lvl="1"/>
-            <a:r>
-              <a:rPr lang="en-US" dirty="0"/>
-              <a:t>End screen</a:t>
-            </a:r>
-          </a:p>
-          <a:p>
-            <a:pPr lvl="1"/>
-            <a:r>
-              <a:rPr lang="en-US" dirty="0"/>
-              <a:t>Help Screen</a:t>
+              <a:t>Next level</a:t>
             </a:r>
           </a:p>
         </p:txBody>
@@ -4796,7 +4966,7 @@
           <p:cNvPr id="4" name="Content Placeholder 3">
             <a:extLst>
               <a:ext uri="{FF2B5EF4-FFF2-40B4-BE49-F238E27FC236}">
-                <a16:creationId xmlns:a16="http://schemas.microsoft.com/office/drawing/2014/main" id="{F2A2E03C-2D2B-4D5A-8ED9-5D81B26E5527}"/>
+                <a16:creationId xmlns:a16="http://schemas.microsoft.com/office/drawing/2014/main" id="{4827A867-19BF-42E5-B704-8BEF273E5822}"/>
               </a:ext>
             </a:extLst>
           </p:cNvPr>
@@ -4819,7 +4989,7 @@
     </p:spTree>
     <p:extLst>
       <p:ext uri="{BB962C8B-B14F-4D97-AF65-F5344CB8AC3E}">
-        <p14:creationId xmlns:p14="http://schemas.microsoft.com/office/powerpoint/2010/main" val="3966481404"/>
+        <p14:creationId xmlns:p14="http://schemas.microsoft.com/office/powerpoint/2010/main" val="4265210884"/>
       </p:ext>
     </p:extLst>
   </p:cSld>
@@ -4851,7 +5021,7 @@
           <p:cNvPr id="2" name="Title 1">
             <a:extLst>
               <a:ext uri="{FF2B5EF4-FFF2-40B4-BE49-F238E27FC236}">
-                <a16:creationId xmlns:a16="http://schemas.microsoft.com/office/drawing/2014/main" id="{3EDBA5B3-1911-4268-A262-AD93A4E43626}"/>
+                <a16:creationId xmlns:a16="http://schemas.microsoft.com/office/drawing/2014/main" id="{E7006F5A-D609-41F0-A288-8EB32F171576}"/>
               </a:ext>
             </a:extLst>
           </p:cNvPr>
@@ -4869,7 +5039,7 @@
           <a:p>
             <a:r>
               <a:rPr lang="en-US" dirty="0"/>
-              <a:t>Director class</a:t>
+              <a:t>Splash Screen class</a:t>
             </a:r>
           </a:p>
         </p:txBody>
@@ -4879,7 +5049,7 @@
           <p:cNvPr id="3" name="Content Placeholder 2">
             <a:extLst>
               <a:ext uri="{FF2B5EF4-FFF2-40B4-BE49-F238E27FC236}">
-                <a16:creationId xmlns:a16="http://schemas.microsoft.com/office/drawing/2014/main" id="{D6E67422-5A05-4F27-B3F8-F6157B1C9FD6}"/>
+                <a16:creationId xmlns:a16="http://schemas.microsoft.com/office/drawing/2014/main" id="{45788C37-68FE-4782-B20C-1F0BA58AD48F}"/>
               </a:ext>
             </a:extLst>
           </p:cNvPr>
@@ -4897,7 +5067,35 @@
           <a:p>
             <a:r>
               <a:rPr lang="en-US" dirty="0"/>
-              <a:t>The director handles the various game functions and maintains the game play.</a:t>
+              <a:t>Handle the various splash screens depending on the stage of the game the user is in.</a:t>
+            </a:r>
+          </a:p>
+          <a:p>
+            <a:pPr lvl="1"/>
+            <a:r>
+              <a:rPr lang="en-US" dirty="0"/>
+              <a:t>Start screen</a:t>
+            </a:r>
+          </a:p>
+          <a:p>
+            <a:pPr lvl="1"/>
+            <a:r>
+              <a:rPr lang="en-US" dirty="0"/>
+              <a:t>Level screens</a:t>
+            </a:r>
+          </a:p>
+          <a:p>
+            <a:pPr lvl="1"/>
+            <a:r>
+              <a:rPr lang="en-US" dirty="0"/>
+              <a:t>End screen</a:t>
+            </a:r>
+          </a:p>
+          <a:p>
+            <a:pPr lvl="1"/>
+            <a:r>
+              <a:rPr lang="en-US" dirty="0"/>
+              <a:t>Help Screen</a:t>
             </a:r>
           </a:p>
         </p:txBody>
@@ -4907,7 +5105,7 @@
           <p:cNvPr id="4" name="Content Placeholder 3">
             <a:extLst>
               <a:ext uri="{FF2B5EF4-FFF2-40B4-BE49-F238E27FC236}">
-                <a16:creationId xmlns:a16="http://schemas.microsoft.com/office/drawing/2014/main" id="{FABD4366-B9F4-493A-9D07-4CE96CC763BA}"/>
+                <a16:creationId xmlns:a16="http://schemas.microsoft.com/office/drawing/2014/main" id="{F2A2E03C-2D2B-4D5A-8ED9-5D81B26E5527}"/>
               </a:ext>
             </a:extLst>
           </p:cNvPr>
@@ -4930,7 +5128,7 @@
     </p:spTree>
     <p:extLst>
       <p:ext uri="{BB962C8B-B14F-4D97-AF65-F5344CB8AC3E}">
-        <p14:creationId xmlns:p14="http://schemas.microsoft.com/office/powerpoint/2010/main" val="321454203"/>
+        <p14:creationId xmlns:p14="http://schemas.microsoft.com/office/powerpoint/2010/main" val="3966481404"/>
       </p:ext>
     </p:extLst>
   </p:cSld>
@@ -4962,7 +5160,7 @@
           <p:cNvPr id="2" name="Title 1">
             <a:extLst>
               <a:ext uri="{FF2B5EF4-FFF2-40B4-BE49-F238E27FC236}">
-                <a16:creationId xmlns:a16="http://schemas.microsoft.com/office/drawing/2014/main" id="{60F5CA51-61B6-424A-BB01-6D439D4F93C5}"/>
+                <a16:creationId xmlns:a16="http://schemas.microsoft.com/office/drawing/2014/main" id="{3EDBA5B3-1911-4268-A262-AD93A4E43626}"/>
               </a:ext>
             </a:extLst>
           </p:cNvPr>
@@ -4980,7 +5178,7 @@
           <a:p>
             <a:r>
               <a:rPr lang="en-US" dirty="0"/>
-              <a:t>Constants class</a:t>
+              <a:t>Director class</a:t>
             </a:r>
           </a:p>
         </p:txBody>
@@ -4990,7 +5188,7 @@
           <p:cNvPr id="3" name="Content Placeholder 2">
             <a:extLst>
               <a:ext uri="{FF2B5EF4-FFF2-40B4-BE49-F238E27FC236}">
-                <a16:creationId xmlns:a16="http://schemas.microsoft.com/office/drawing/2014/main" id="{9F39D27B-5BB0-425C-A2EF-022F7CF29A23}"/>
+                <a16:creationId xmlns:a16="http://schemas.microsoft.com/office/drawing/2014/main" id="{D6E67422-5A05-4F27-B3F8-F6157B1C9FD6}"/>
               </a:ext>
             </a:extLst>
           </p:cNvPr>
@@ -5003,98 +5201,12 @@
         </p:nvSpPr>
         <p:spPr/>
         <p:txBody>
-          <a:bodyPr>
-            <a:normAutofit fontScale="92500" lnSpcReduction="20000"/>
-          </a:bodyPr>
-          <a:lstStyle/>
-          <a:p>
-            <a:r>
-              <a:rPr lang="en-US" dirty="0"/>
-              <a:t>All our game constants will live in here</a:t>
-            </a:r>
-          </a:p>
-          <a:p>
-            <a:pPr lvl="1"/>
-            <a:r>
-              <a:rPr lang="en-US" dirty="0"/>
-              <a:t>Screen width</a:t>
-            </a:r>
-          </a:p>
-          <a:p>
-            <a:pPr lvl="1"/>
-            <a:r>
-              <a:rPr lang="en-US" dirty="0"/>
-              <a:t>Screen Height</a:t>
-            </a:r>
-          </a:p>
-          <a:p>
-            <a:pPr lvl="1"/>
-            <a:r>
-              <a:rPr lang="en-US" dirty="0"/>
-              <a:t>Title</a:t>
-            </a:r>
-          </a:p>
-          <a:p>
-            <a:pPr lvl="1"/>
-            <a:r>
-              <a:rPr lang="en-US" dirty="0"/>
-              <a:t>Start location</a:t>
-            </a:r>
-          </a:p>
-          <a:p>
-            <a:pPr lvl="1"/>
-            <a:r>
-              <a:rPr lang="en-US" dirty="0"/>
-              <a:t>Max Lives</a:t>
-            </a:r>
-          </a:p>
-          <a:p>
-            <a:pPr lvl="1"/>
-            <a:r>
-              <a:rPr lang="en-US" dirty="0"/>
-              <a:t>File path to riddle folder</a:t>
-            </a:r>
-          </a:p>
-          <a:p>
-            <a:pPr lvl="1"/>
-            <a:r>
-              <a:rPr lang="en-US" dirty="0"/>
-              <a:t>Character Scaling</a:t>
-            </a:r>
-          </a:p>
-          <a:p>
-            <a:pPr lvl="1"/>
-            <a:r>
-              <a:rPr lang="en-US" dirty="0"/>
-              <a:t>Tile Scaling</a:t>
-            </a:r>
-          </a:p>
-          <a:p>
-            <a:pPr lvl="1"/>
-            <a:r>
-              <a:rPr lang="en-US" dirty="0"/>
-              <a:t>Coin Scaling </a:t>
-            </a:r>
-          </a:p>
-          <a:p>
-            <a:pPr lvl="1"/>
-            <a:r>
-              <a:rPr lang="en-US" dirty="0"/>
-              <a:t>Movement Speed</a:t>
-            </a:r>
-          </a:p>
-          <a:p>
-            <a:pPr lvl="1"/>
-            <a:r>
-              <a:rPr lang="en-US" dirty="0"/>
-              <a:t>Gravity</a:t>
-            </a:r>
-          </a:p>
-          <a:p>
-            <a:pPr lvl="1"/>
-            <a:r>
-              <a:rPr lang="en-US" dirty="0"/>
-              <a:t>Jump Speed</a:t>
+          <a:bodyPr/>
+          <a:lstStyle/>
+          <a:p>
+            <a:r>
+              <a:rPr lang="en-US" dirty="0"/>
+              <a:t>The director handles the various game functions and maintains the game play.</a:t>
             </a:r>
           </a:p>
         </p:txBody>
@@ -5104,7 +5216,7 @@
           <p:cNvPr id="4" name="Content Placeholder 3">
             <a:extLst>
               <a:ext uri="{FF2B5EF4-FFF2-40B4-BE49-F238E27FC236}">
-                <a16:creationId xmlns:a16="http://schemas.microsoft.com/office/drawing/2014/main" id="{C512575D-0C42-46DF-B595-FF44E303F521}"/>
+                <a16:creationId xmlns:a16="http://schemas.microsoft.com/office/drawing/2014/main" id="{FABD4366-B9F4-493A-9D07-4CE96CC763BA}"/>
               </a:ext>
             </a:extLst>
           </p:cNvPr>
@@ -5117,9 +5229,7 @@
         </p:nvSpPr>
         <p:spPr/>
         <p:txBody>
-          <a:bodyPr>
-            <a:normAutofit fontScale="92500" lnSpcReduction="20000"/>
-          </a:bodyPr>
+          <a:bodyPr/>
           <a:lstStyle/>
           <a:p>
             <a:endParaRPr lang="en-US"/>
@@ -5129,7 +5239,7 @@
     </p:spTree>
     <p:extLst>
       <p:ext uri="{BB962C8B-B14F-4D97-AF65-F5344CB8AC3E}">
-        <p14:creationId xmlns:p14="http://schemas.microsoft.com/office/powerpoint/2010/main" val="932568532"/>
+        <p14:creationId xmlns:p14="http://schemas.microsoft.com/office/powerpoint/2010/main" val="321454203"/>
       </p:ext>
     </p:extLst>
   </p:cSld>
@@ -5161,7 +5271,7 @@
           <p:cNvPr id="2" name="Title 1">
             <a:extLst>
               <a:ext uri="{FF2B5EF4-FFF2-40B4-BE49-F238E27FC236}">
-                <a16:creationId xmlns:a16="http://schemas.microsoft.com/office/drawing/2014/main" id="{C4E993F9-FF22-44FA-9189-B3C30010754B}"/>
+                <a16:creationId xmlns:a16="http://schemas.microsoft.com/office/drawing/2014/main" id="{60F5CA51-61B6-424A-BB01-6D439D4F93C5}"/>
               </a:ext>
             </a:extLst>
           </p:cNvPr>
@@ -5178,12 +5288,8 @@
           <a:lstStyle/>
           <a:p>
             <a:r>
-              <a:rPr lang="en-US" dirty="0" err="1"/>
-              <a:t>Input_service</a:t>
-            </a:r>
-            <a:r>
-              <a:rPr lang="en-US" dirty="0"/>
-              <a:t> class</a:t>
+              <a:rPr lang="en-US" dirty="0"/>
+              <a:t>Constants class</a:t>
             </a:r>
           </a:p>
         </p:txBody>
@@ -5193,7 +5299,7 @@
           <p:cNvPr id="3" name="Content Placeholder 2">
             <a:extLst>
               <a:ext uri="{FF2B5EF4-FFF2-40B4-BE49-F238E27FC236}">
-                <a16:creationId xmlns:a16="http://schemas.microsoft.com/office/drawing/2014/main" id="{29F26100-1EB6-44E3-A057-15FFF0270DCF}"/>
+                <a16:creationId xmlns:a16="http://schemas.microsoft.com/office/drawing/2014/main" id="{9F39D27B-5BB0-425C-A2EF-022F7CF29A23}"/>
               </a:ext>
             </a:extLst>
           </p:cNvPr>
@@ -5206,10 +5312,99 @@
         </p:nvSpPr>
         <p:spPr/>
         <p:txBody>
-          <a:bodyPr/>
-          <a:lstStyle/>
-          <a:p>
-            <a:endParaRPr lang="en-US"/>
+          <a:bodyPr>
+            <a:normAutofit fontScale="92500" lnSpcReduction="20000"/>
+          </a:bodyPr>
+          <a:lstStyle/>
+          <a:p>
+            <a:r>
+              <a:rPr lang="en-US" dirty="0"/>
+              <a:t>All our game constants will live in here</a:t>
+            </a:r>
+          </a:p>
+          <a:p>
+            <a:pPr lvl="1"/>
+            <a:r>
+              <a:rPr lang="en-US" dirty="0"/>
+              <a:t>Screen width</a:t>
+            </a:r>
+          </a:p>
+          <a:p>
+            <a:pPr lvl="1"/>
+            <a:r>
+              <a:rPr lang="en-US" dirty="0"/>
+              <a:t>Screen Height</a:t>
+            </a:r>
+          </a:p>
+          <a:p>
+            <a:pPr lvl="1"/>
+            <a:r>
+              <a:rPr lang="en-US" dirty="0"/>
+              <a:t>Title</a:t>
+            </a:r>
+          </a:p>
+          <a:p>
+            <a:pPr lvl="1"/>
+            <a:r>
+              <a:rPr lang="en-US" dirty="0"/>
+              <a:t>Start location</a:t>
+            </a:r>
+          </a:p>
+          <a:p>
+            <a:pPr lvl="1"/>
+            <a:r>
+              <a:rPr lang="en-US" dirty="0"/>
+              <a:t>Max Lives</a:t>
+            </a:r>
+          </a:p>
+          <a:p>
+            <a:pPr lvl="1"/>
+            <a:r>
+              <a:rPr lang="en-US" dirty="0"/>
+              <a:t>File path to riddle folder</a:t>
+            </a:r>
+          </a:p>
+          <a:p>
+            <a:pPr lvl="1"/>
+            <a:r>
+              <a:rPr lang="en-US" dirty="0"/>
+              <a:t>Character Scaling</a:t>
+            </a:r>
+          </a:p>
+          <a:p>
+            <a:pPr lvl="1"/>
+            <a:r>
+              <a:rPr lang="en-US" dirty="0"/>
+              <a:t>Tile Scaling</a:t>
+            </a:r>
+          </a:p>
+          <a:p>
+            <a:pPr lvl="1"/>
+            <a:r>
+              <a:rPr lang="en-US" dirty="0"/>
+              <a:t>Coin Scaling </a:t>
+            </a:r>
+          </a:p>
+          <a:p>
+            <a:pPr lvl="1"/>
+            <a:r>
+              <a:rPr lang="en-US" dirty="0"/>
+              <a:t>Movement Speed</a:t>
+            </a:r>
+          </a:p>
+          <a:p>
+            <a:pPr lvl="1"/>
+            <a:r>
+              <a:rPr lang="en-US" dirty="0"/>
+              <a:t>Gravity</a:t>
+            </a:r>
+          </a:p>
+          <a:p>
+            <a:pPr lvl="1"/>
+            <a:r>
+              <a:rPr lang="en-US" dirty="0"/>
+              <a:t>Jump Speed</a:t>
+            </a:r>
           </a:p>
         </p:txBody>
       </p:sp>
@@ -5218,7 +5413,7 @@
           <p:cNvPr id="4" name="Content Placeholder 3">
             <a:extLst>
               <a:ext uri="{FF2B5EF4-FFF2-40B4-BE49-F238E27FC236}">
-                <a16:creationId xmlns:a16="http://schemas.microsoft.com/office/drawing/2014/main" id="{84583010-6006-4F89-9FAE-C81CAC752783}"/>
+                <a16:creationId xmlns:a16="http://schemas.microsoft.com/office/drawing/2014/main" id="{C512575D-0C42-46DF-B595-FF44E303F521}"/>
               </a:ext>
             </a:extLst>
           </p:cNvPr>
@@ -5231,7 +5426,9 @@
         </p:nvSpPr>
         <p:spPr/>
         <p:txBody>
-          <a:bodyPr/>
+          <a:bodyPr>
+            <a:normAutofit fontScale="92500" lnSpcReduction="20000"/>
+          </a:bodyPr>
           <a:lstStyle/>
           <a:p>
             <a:endParaRPr lang="en-US"/>
@@ -5241,7 +5438,7 @@
     </p:spTree>
     <p:extLst>
       <p:ext uri="{BB962C8B-B14F-4D97-AF65-F5344CB8AC3E}">
-        <p14:creationId xmlns:p14="http://schemas.microsoft.com/office/powerpoint/2010/main" val="3522928421"/>
+        <p14:creationId xmlns:p14="http://schemas.microsoft.com/office/powerpoint/2010/main" val="932568532"/>
       </p:ext>
     </p:extLst>
   </p:cSld>

</xml_diff>